<commit_message>
added full recordings to VAS folder and added powerpoint notes and tutorial for VAS stim
</commit_message>
<xml_diff>
--- a/A_Stimuli_Materials/VAS/recording_materials_and_stimuli_notes.pptx
+++ b/A_Stimuli_Materials/VAS/recording_materials_and_stimuli_notes.pptx
@@ -241,7 +241,7 @@
           <a:p>
             <a:fld id="{E560B40D-19AD-ED4C-A44E-851865A53ABA}" type="datetimeFigureOut">
               <a:rPr lang="en-US" smtClean="0"/>
-              <a:t>8/4/25</a:t>
+              <a:t>8/9/25</a:t>
             </a:fld>
             <a:endParaRPr lang="en-US"/>
           </a:p>
@@ -564,7 +564,7 @@
             </a:pPr>
             <a:r>
               <a:rPr lang="en-US" dirty="0"/>
-              <a:t>first time read as written with quotations around target word, sentences repeated only once (she forgot) = YA-raw-recording-june-4-first-attempt</a:t>
+              <a:t>first time read as written with quotations around target word, sentences repeated only once (she forgot) = female-raw-recording-june-4-first-attempt</a:t>
             </a:r>
           </a:p>
           <a:p>
@@ -574,7 +574,7 @@
             </a:pPr>
             <a:r>
               <a:rPr lang="en-US" dirty="0"/>
-              <a:t>second time we tried without the quotations around target word because we both thought it sounded too unnatural, sentences repeated twice = YA-raw-recording-june-4-second-attempt.wav</a:t>
+              <a:t>second time we tried without the quotations around target word because we both thought it sounded too unnatural, sentences repeated twice = female-raw-recording-june-4-second-attempt.wav</a:t>
             </a:r>
           </a:p>
           <a:p>
@@ -584,7 +584,7 @@
             </a:pPr>
             <a:r>
               <a:rPr lang="en-US" dirty="0"/>
-              <a:t>third time we put the quotations back because of too much coarticulation made it hard to isolate the words, sentences repeated twice = YA-raw-recording-june-4-third-attempt.wav</a:t>
+              <a:t>third time we put the quotations back because of too much coarticulation made it hard to isolate the words, sentences repeated twice = female-raw-recording-june-4-third-attempt.wav</a:t>
             </a:r>
           </a:p>
           <a:p>
@@ -675,6 +675,90 @@
 </file>
 
 <file path=ppt/notesSlides/notesSlide10.xml><?xml version="1.0" encoding="utf-8"?>
+<p:notes xmlns:a="http://schemas.openxmlformats.org/drawingml/2006/main" xmlns:r="http://schemas.openxmlformats.org/officeDocument/2006/relationships" xmlns:p="http://schemas.openxmlformats.org/presentationml/2006/main">
+  <p:cSld>
+    <p:spTree>
+      <p:nvGrpSpPr>
+        <p:cNvPr id="1" name=""/>
+        <p:cNvGrpSpPr/>
+        <p:nvPr/>
+      </p:nvGrpSpPr>
+      <p:grpSpPr>
+        <a:xfrm>
+          <a:off x="0" y="0"/>
+          <a:ext cx="0" cy="0"/>
+          <a:chOff x="0" y="0"/>
+          <a:chExt cx="0" cy="0"/>
+        </a:xfrm>
+      </p:grpSpPr>
+      <p:sp>
+        <p:nvSpPr>
+          <p:cNvPr id="2" name="Slide Image Placeholder 1"/>
+          <p:cNvSpPr>
+            <a:spLocks noGrp="1" noRot="1" noChangeAspect="1"/>
+          </p:cNvSpPr>
+          <p:nvPr>
+            <p:ph type="sldImg"/>
+          </p:nvPr>
+        </p:nvSpPr>
+        <p:spPr/>
+      </p:sp>
+      <p:sp>
+        <p:nvSpPr>
+          <p:cNvPr id="3" name="Notes Placeholder 2"/>
+          <p:cNvSpPr>
+            <a:spLocks noGrp="1"/>
+          </p:cNvSpPr>
+          <p:nvPr>
+            <p:ph type="body" idx="1"/>
+          </p:nvPr>
+        </p:nvSpPr>
+        <p:spPr/>
+        <p:txBody>
+          <a:bodyPr/>
+          <a:lstStyle/>
+          <a:p>
+            <a:endParaRPr lang="en-US" dirty="0"/>
+          </a:p>
+        </p:txBody>
+      </p:sp>
+      <p:sp>
+        <p:nvSpPr>
+          <p:cNvPr id="4" name="Slide Number Placeholder 3"/>
+          <p:cNvSpPr>
+            <a:spLocks noGrp="1"/>
+          </p:cNvSpPr>
+          <p:nvPr>
+            <p:ph type="sldNum" sz="quarter" idx="5"/>
+          </p:nvPr>
+        </p:nvSpPr>
+        <p:spPr/>
+        <p:txBody>
+          <a:bodyPr/>
+          <a:lstStyle/>
+          <a:p>
+            <a:fld id="{8D84D065-75B2-C547-A1E0-43719E6097C2}" type="slidenum">
+              <a:rPr lang="en-US" smtClean="0"/>
+              <a:t>28</a:t>
+            </a:fld>
+            <a:endParaRPr lang="en-US"/>
+          </a:p>
+        </p:txBody>
+      </p:sp>
+    </p:spTree>
+    <p:extLst>
+      <p:ext uri="{BB962C8B-B14F-4D97-AF65-F5344CB8AC3E}">
+        <p14:creationId xmlns:p14="http://schemas.microsoft.com/office/powerpoint/2010/main" val="2402246965"/>
+      </p:ext>
+    </p:extLst>
+  </p:cSld>
+  <p:clrMapOvr>
+    <a:masterClrMapping/>
+  </p:clrMapOvr>
+</p:notes>
+</file>
+
+<file path=ppt/notesSlides/notesSlide11.xml><?xml version="1.0" encoding="utf-8"?>
 <p:notes xmlns:a="http://schemas.openxmlformats.org/drawingml/2006/main" xmlns:r="http://schemas.openxmlformats.org/officeDocument/2006/relationships" xmlns:p="http://schemas.openxmlformats.org/presentationml/2006/main">
   <p:cSld>
     <p:spTree>
@@ -782,7 +866,7 @@
 </p:notes>
 </file>
 
-<file path=ppt/notesSlides/notesSlide11.xml><?xml version="1.0" encoding="utf-8"?>
+<file path=ppt/notesSlides/notesSlide12.xml><?xml version="1.0" encoding="utf-8"?>
 <p:notes xmlns:a="http://schemas.openxmlformats.org/drawingml/2006/main" xmlns:r="http://schemas.openxmlformats.org/officeDocument/2006/relationships" xmlns:p="http://schemas.openxmlformats.org/presentationml/2006/main">
   <p:cSld>
     <p:spTree>
@@ -890,7 +974,7 @@
 </p:notes>
 </file>
 
-<file path=ppt/notesSlides/notesSlide12.xml><?xml version="1.0" encoding="utf-8"?>
+<file path=ppt/notesSlides/notesSlide13.xml><?xml version="1.0" encoding="utf-8"?>
 <p:notes xmlns:a="http://schemas.openxmlformats.org/drawingml/2006/main" xmlns:r="http://schemas.openxmlformats.org/officeDocument/2006/relationships" xmlns:p="http://schemas.openxmlformats.org/presentationml/2006/main">
   <p:cSld>
     <p:spTree>
@@ -1144,7 +1228,7 @@
 </p:notes>
 </file>
 
-<file path=ppt/notesSlides/notesSlide13.xml><?xml version="1.0" encoding="utf-8"?>
+<file path=ppt/notesSlides/notesSlide14.xml><?xml version="1.0" encoding="utf-8"?>
 <p:notes xmlns:a="http://schemas.openxmlformats.org/drawingml/2006/main" xmlns:r="http://schemas.openxmlformats.org/officeDocument/2006/relationships" xmlns:p="http://schemas.openxmlformats.org/presentationml/2006/main">
   <p:cSld>
     <p:spTree>
@@ -1413,1080 +1497,6 @@
     <p:extLst>
       <p:ext uri="{BB962C8B-B14F-4D97-AF65-F5344CB8AC3E}">
         <p14:creationId xmlns:p14="http://schemas.microsoft.com/office/powerpoint/2010/main" val="4237675241"/>
-      </p:ext>
-    </p:extLst>
-  </p:cSld>
-  <p:clrMapOvr>
-    <a:masterClrMapping/>
-  </p:clrMapOvr>
-</p:notes>
-</file>
-
-<file path=ppt/notesSlides/notesSlide14.xml><?xml version="1.0" encoding="utf-8"?>
-<p:notes xmlns:a="http://schemas.openxmlformats.org/drawingml/2006/main" xmlns:r="http://schemas.openxmlformats.org/officeDocument/2006/relationships" xmlns:p="http://schemas.openxmlformats.org/presentationml/2006/main">
-  <p:cSld>
-    <p:spTree>
-      <p:nvGrpSpPr>
-        <p:cNvPr id="1" name=""/>
-        <p:cNvGrpSpPr/>
-        <p:nvPr/>
-      </p:nvGrpSpPr>
-      <p:grpSpPr>
-        <a:xfrm>
-          <a:off x="0" y="0"/>
-          <a:ext cx="0" cy="0"/>
-          <a:chOff x="0" y="0"/>
-          <a:chExt cx="0" cy="0"/>
-        </a:xfrm>
-      </p:grpSpPr>
-      <p:sp>
-        <p:nvSpPr>
-          <p:cNvPr id="2" name="Slide Image Placeholder 1"/>
-          <p:cNvSpPr>
-            <a:spLocks noGrp="1" noRot="1" noChangeAspect="1"/>
-          </p:cNvSpPr>
-          <p:nvPr>
-            <p:ph type="sldImg"/>
-          </p:nvPr>
-        </p:nvSpPr>
-        <p:spPr/>
-      </p:sp>
-      <p:sp>
-        <p:nvSpPr>
-          <p:cNvPr id="3" name="Notes Placeholder 2"/>
-          <p:cNvSpPr>
-            <a:spLocks noGrp="1"/>
-          </p:cNvSpPr>
-          <p:nvPr>
-            <p:ph type="body" idx="1"/>
-          </p:nvPr>
-        </p:nvSpPr>
-        <p:spPr/>
-        <p:txBody>
-          <a:bodyPr/>
-          <a:lstStyle/>
-          <a:p>
-            <a:pPr marL="171450" indent="-171450">
-              <a:buFontTx/>
-              <a:buChar char="-"/>
-            </a:pPr>
-            <a:r>
-              <a:rPr lang="en-US" dirty="0"/>
-              <a:t>Notes:</a:t>
-            </a:r>
-          </a:p>
-          <a:p>
-            <a:pPr marL="171450" indent="-171450">
-              <a:buFontTx/>
-              <a:buChar char="-"/>
-            </a:pPr>
-            <a:r>
-              <a:rPr lang="en-US" dirty="0"/>
-              <a:t>the exact wav files used in this manipulation were toru_2_mod.wav and tooru_1_mod.wav – within Praat, I renamed them </a:t>
-            </a:r>
-            <a:r>
-              <a:rPr lang="en-US" dirty="0" err="1"/>
-              <a:t>toru</a:t>
-            </a:r>
-            <a:r>
-              <a:rPr lang="en-US" dirty="0"/>
-              <a:t> and </a:t>
-            </a:r>
-            <a:r>
-              <a:rPr lang="en-US" dirty="0" err="1"/>
-              <a:t>tooru</a:t>
-            </a:r>
-            <a:r>
-              <a:rPr lang="en-US" dirty="0"/>
-              <a:t> to make the naming process of the continua files easier</a:t>
-            </a:r>
-          </a:p>
-          <a:p>
-            <a:pPr marL="171450" indent="-171450">
-              <a:buFontTx/>
-              <a:buChar char="-"/>
-            </a:pPr>
-            <a:r>
-              <a:rPr lang="en-US" dirty="0"/>
-              <a:t>first I will make two equivalent duration continua, one that starts from each endpoint (of JUST the vowel length – C1, C2, and V2 duration will remain constant)</a:t>
-            </a:r>
-          </a:p>
-          <a:p>
-            <a:pPr marL="171450" indent="-171450">
-              <a:buFontTx/>
-              <a:buChar char="-"/>
-            </a:pPr>
-            <a:r>
-              <a:rPr lang="en-US" dirty="0"/>
-              <a:t>then I will interpolate pitch between the endpoints of equivalent duration (this includes pitch across V1 and V2)</a:t>
-            </a:r>
-          </a:p>
-          <a:p>
-            <a:pPr marL="171450" indent="-171450">
-              <a:buFontTx/>
-              <a:buChar char="-"/>
-            </a:pPr>
-            <a:r>
-              <a:rPr lang="en-US" dirty="0"/>
-              <a:t>because of the creaks at the end of the word (at the end of V2), I chose to edit out the last of the creaky voice where the regularity of the periodicity breaks down, and then replace it with 50ms of silence (specifically I concatenated with overlap, with the overlap being 1 ms (0.001 s)</a:t>
-            </a:r>
-          </a:p>
-          <a:p>
-            <a:pPr marL="171450" indent="-171450">
-              <a:buFontTx/>
-              <a:buChar char="-"/>
-            </a:pPr>
-            <a:r>
-              <a:rPr lang="en-US" dirty="0"/>
-              <a:t>I did this for both </a:t>
-            </a:r>
-            <a:r>
-              <a:rPr lang="en-US" dirty="0" err="1"/>
-              <a:t>toru</a:t>
-            </a:r>
-            <a:r>
-              <a:rPr lang="en-US" dirty="0"/>
-              <a:t> and </a:t>
-            </a:r>
-            <a:r>
-              <a:rPr lang="en-US" dirty="0" err="1"/>
-              <a:t>tooru</a:t>
-            </a:r>
-            <a:r>
-              <a:rPr lang="en-US" dirty="0"/>
-              <a:t>, and both are now called toru_2_mod.wav and tooru_1_mod.wav respectively – this works better for the pulse tracking on the manipulation object for the pitch and duration manipulations</a:t>
-            </a:r>
-          </a:p>
-          <a:p>
-            <a:pPr marL="171450" indent="-171450">
-              <a:buFontTx/>
-              <a:buChar char="-"/>
-            </a:pPr>
-            <a:r>
-              <a:rPr lang="en-US" dirty="0"/>
-              <a:t>I also had to adjust the silence at the beginning so that the start of the two words would be aligned and thus each of the duration manipulated steps (made from each starting point – continuum steps made from </a:t>
-            </a:r>
-            <a:r>
-              <a:rPr lang="en-US" dirty="0" err="1"/>
-              <a:t>toru</a:t>
-            </a:r>
-            <a:r>
-              <a:rPr lang="en-US" dirty="0"/>
-              <a:t> and continuum steps made from </a:t>
-            </a:r>
-            <a:r>
-              <a:rPr lang="en-US" dirty="0" err="1"/>
-              <a:t>tooru</a:t>
-            </a:r>
-            <a:r>
-              <a:rPr lang="en-US" dirty="0"/>
-              <a:t>) would also be aligned in order to properly do the pitch manipulation</a:t>
-            </a:r>
-          </a:p>
-          <a:p>
-            <a:pPr marL="171450" marR="0" lvl="0" indent="-171450" algn="l" defTabSz="914400" rtl="0" eaLnBrk="1" fontAlgn="auto" latinLnBrk="0" hangingPunct="1">
-              <a:lnSpc>
-                <a:spcPct val="100000"/>
-              </a:lnSpc>
-              <a:spcBef>
-                <a:spcPts val="0"/>
-              </a:spcBef>
-              <a:spcAft>
-                <a:spcPts val="0"/>
-              </a:spcAft>
-              <a:buClrTx/>
-              <a:buSzTx/>
-              <a:buFontTx/>
-              <a:buChar char="-"/>
-              <a:tabLst/>
-              <a:defRPr/>
-            </a:pPr>
-            <a:r>
-              <a:rPr lang="en-US" dirty="0"/>
-              <a:t>tooru_1_mod.wav had </a:t>
-            </a:r>
-            <a:r>
-              <a:rPr lang="en-US" dirty="0">
-                <a:solidFill>
-                  <a:srgbClr val="000000"/>
-                </a:solidFill>
-                <a:effectLst/>
-                <a:latin typeface="Menlo" panose="020B0609030804020204" pitchFamily="49" charset="0"/>
-              </a:rPr>
-              <a:t>0.050226757369614516 s before the start of the word</a:t>
-            </a:r>
-          </a:p>
-          <a:p>
-            <a:pPr marL="171450" marR="0" lvl="0" indent="-171450" algn="l" defTabSz="914400" rtl="0" eaLnBrk="1" fontAlgn="auto" latinLnBrk="0" hangingPunct="1">
-              <a:lnSpc>
-                <a:spcPct val="100000"/>
-              </a:lnSpc>
-              <a:spcBef>
-                <a:spcPts val="0"/>
-              </a:spcBef>
-              <a:spcAft>
-                <a:spcPts val="0"/>
-              </a:spcAft>
-              <a:buClrTx/>
-              <a:buSzTx/>
-              <a:buFontTx/>
-              <a:buChar char="-"/>
-              <a:tabLst/>
-              <a:defRPr/>
-            </a:pPr>
-            <a:r>
-              <a:rPr lang="en-US" dirty="0">
-                <a:solidFill>
-                  <a:srgbClr val="000000"/>
-                </a:solidFill>
-                <a:effectLst/>
-                <a:latin typeface="Menlo" panose="020B0609030804020204" pitchFamily="49" charset="0"/>
-              </a:rPr>
-              <a:t>toru_2_mod.wav had 0.026341107871720115 s before the start of the word</a:t>
-            </a:r>
-          </a:p>
-          <a:p>
-            <a:pPr marL="171450" marR="0" lvl="0" indent="-171450" algn="l" defTabSz="914400" rtl="0" eaLnBrk="1" fontAlgn="auto" latinLnBrk="0" hangingPunct="1">
-              <a:lnSpc>
-                <a:spcPct val="100000"/>
-              </a:lnSpc>
-              <a:spcBef>
-                <a:spcPts val="0"/>
-              </a:spcBef>
-              <a:spcAft>
-                <a:spcPts val="0"/>
-              </a:spcAft>
-              <a:buClrTx/>
-              <a:buSzTx/>
-              <a:buFontTx/>
-              <a:buChar char="-"/>
-              <a:tabLst/>
-              <a:defRPr/>
-            </a:pPr>
-            <a:r>
-              <a:rPr lang="en-US" dirty="0">
-                <a:solidFill>
-                  <a:srgbClr val="000000"/>
-                </a:solidFill>
-                <a:effectLst/>
-                <a:latin typeface="Menlo" panose="020B0609030804020204" pitchFamily="49" charset="0"/>
-              </a:rPr>
-              <a:t>so I added </a:t>
-            </a:r>
-            <a:r>
-              <a:rPr lang="en-US" b="0" i="0" dirty="0">
-                <a:solidFill>
-                  <a:srgbClr val="ECECEC"/>
-                </a:solidFill>
-                <a:effectLst/>
-                <a:latin typeface="Google Sans"/>
-              </a:rPr>
-              <a:t>0.02388564949 s to the start of toru_2_mod.wav and the corresponding text grid (new text grid is saved as toru_2_mod.TextGrid)</a:t>
-            </a:r>
-          </a:p>
-          <a:p>
-            <a:pPr marL="171450" marR="0" lvl="0" indent="-171450" algn="l" defTabSz="914400" rtl="0" eaLnBrk="1" fontAlgn="auto" latinLnBrk="0" hangingPunct="1">
-              <a:lnSpc>
-                <a:spcPct val="100000"/>
-              </a:lnSpc>
-              <a:spcBef>
-                <a:spcPts val="0"/>
-              </a:spcBef>
-              <a:spcAft>
-                <a:spcPts val="0"/>
-              </a:spcAft>
-              <a:buClrTx/>
-              <a:buSzTx/>
-              <a:buFontTx/>
-              <a:buChar char="-"/>
-              <a:tabLst/>
-              <a:defRPr/>
-            </a:pPr>
-            <a:r>
-              <a:rPr lang="en-US" b="0" i="0" dirty="0">
-                <a:solidFill>
-                  <a:srgbClr val="ECECEC"/>
-                </a:solidFill>
-                <a:effectLst/>
-                <a:latin typeface="Google Sans"/>
-              </a:rPr>
-              <a:t>I made two versions of all 35 tokens (7 dur x 5 F0), since the duration and F0 manipulations done on Praat can only be done using one word as the origin word and then interpolate to the </a:t>
-            </a:r>
-            <a:r>
-              <a:rPr lang="en-US" b="0" i="1" dirty="0">
-                <a:solidFill>
-                  <a:srgbClr val="ECECEC"/>
-                </a:solidFill>
-                <a:effectLst/>
-                <a:latin typeface="Google Sans"/>
-              </a:rPr>
-              <a:t>values</a:t>
-            </a:r>
-            <a:r>
-              <a:rPr lang="en-US" b="0" i="0" dirty="0">
-                <a:solidFill>
-                  <a:srgbClr val="ECECEC"/>
-                </a:solidFill>
-                <a:effectLst/>
-                <a:latin typeface="Google Sans"/>
-              </a:rPr>
-              <a:t> of the other word – i.e., manipulations are only being done using one sound file as the origin, not a merge between the two</a:t>
-            </a:r>
-          </a:p>
-          <a:p>
-            <a:pPr marL="628650" marR="0" lvl="1" indent="-171450" algn="l" defTabSz="914400" rtl="0" eaLnBrk="1" fontAlgn="auto" latinLnBrk="0" hangingPunct="1">
-              <a:lnSpc>
-                <a:spcPct val="100000"/>
-              </a:lnSpc>
-              <a:spcBef>
-                <a:spcPts val="0"/>
-              </a:spcBef>
-              <a:spcAft>
-                <a:spcPts val="0"/>
-              </a:spcAft>
-              <a:buClrTx/>
-              <a:buSzTx/>
-              <a:buFontTx/>
-              <a:buChar char="-"/>
-              <a:tabLst/>
-              <a:defRPr/>
-            </a:pPr>
-            <a:r>
-              <a:rPr lang="en-US" b="0" i="0" dirty="0">
-                <a:solidFill>
-                  <a:srgbClr val="ECECEC"/>
-                </a:solidFill>
-                <a:effectLst/>
-                <a:latin typeface="Google Sans"/>
-              </a:rPr>
-              <a:t>first I made two duration continua, one that is </a:t>
-            </a:r>
-            <a:r>
-              <a:rPr lang="en-US" b="0" i="0" dirty="0" err="1">
-                <a:solidFill>
-                  <a:srgbClr val="ECECEC"/>
-                </a:solidFill>
-                <a:effectLst/>
-                <a:latin typeface="Google Sans"/>
-              </a:rPr>
-              <a:t>toru_origin</a:t>
-            </a:r>
-            <a:r>
-              <a:rPr lang="en-US" b="0" i="0" dirty="0">
-                <a:solidFill>
-                  <a:srgbClr val="ECECEC"/>
-                </a:solidFill>
-                <a:effectLst/>
-                <a:latin typeface="Google Sans"/>
-              </a:rPr>
-              <a:t> and one that is </a:t>
-            </a:r>
-            <a:r>
-              <a:rPr lang="en-US" b="0" i="0" dirty="0" err="1">
-                <a:solidFill>
-                  <a:srgbClr val="ECECEC"/>
-                </a:solidFill>
-                <a:effectLst/>
-                <a:latin typeface="Google Sans"/>
-              </a:rPr>
-              <a:t>tooru_origin</a:t>
-            </a:r>
-            <a:endParaRPr lang="en-US" b="0" i="0" dirty="0">
-              <a:solidFill>
-                <a:srgbClr val="ECECEC"/>
-              </a:solidFill>
-              <a:effectLst/>
-              <a:latin typeface="Google Sans"/>
-            </a:endParaRPr>
-          </a:p>
-          <a:p>
-            <a:pPr marL="628650" marR="0" lvl="1" indent="-171450" algn="l" defTabSz="914400" rtl="0" eaLnBrk="1" fontAlgn="auto" latinLnBrk="0" hangingPunct="1">
-              <a:lnSpc>
-                <a:spcPct val="100000"/>
-              </a:lnSpc>
-              <a:spcBef>
-                <a:spcPts val="0"/>
-              </a:spcBef>
-              <a:spcAft>
-                <a:spcPts val="0"/>
-              </a:spcAft>
-              <a:buClrTx/>
-              <a:buSzTx/>
-              <a:buFontTx/>
-              <a:buChar char="-"/>
-              <a:tabLst/>
-              <a:defRPr/>
-            </a:pPr>
-            <a:r>
-              <a:rPr lang="en-US" b="0" i="0" dirty="0">
-                <a:solidFill>
-                  <a:srgbClr val="ECECEC"/>
-                </a:solidFill>
-                <a:effectLst/>
-                <a:latin typeface="Google Sans"/>
-              </a:rPr>
-              <a:t>then I will make two different F0 continua from each of these that interpolate the F0 contours between the equivalent duration steps of the </a:t>
-            </a:r>
-            <a:r>
-              <a:rPr lang="en-US" b="0" i="0" dirty="0" err="1">
-                <a:solidFill>
-                  <a:srgbClr val="ECECEC"/>
-                </a:solidFill>
-                <a:effectLst/>
-                <a:latin typeface="Google Sans"/>
-              </a:rPr>
-              <a:t>toru_origin</a:t>
-            </a:r>
-            <a:r>
-              <a:rPr lang="en-US" b="0" i="0" dirty="0">
-                <a:solidFill>
-                  <a:srgbClr val="ECECEC"/>
-                </a:solidFill>
-                <a:effectLst/>
-                <a:latin typeface="Google Sans"/>
-              </a:rPr>
-              <a:t> and </a:t>
-            </a:r>
-            <a:r>
-              <a:rPr lang="en-US" b="0" i="0" dirty="0" err="1">
-                <a:solidFill>
-                  <a:srgbClr val="ECECEC"/>
-                </a:solidFill>
-                <a:effectLst/>
-                <a:latin typeface="Google Sans"/>
-              </a:rPr>
-              <a:t>tooru_origin</a:t>
-            </a:r>
-            <a:r>
-              <a:rPr lang="en-US" b="0" i="0" dirty="0">
-                <a:solidFill>
-                  <a:srgbClr val="ECECEC"/>
-                </a:solidFill>
-                <a:effectLst/>
-                <a:latin typeface="Google Sans"/>
-              </a:rPr>
-              <a:t> continua</a:t>
-            </a:r>
-          </a:p>
-          <a:p>
-            <a:pPr marL="628650" marR="0" lvl="1" indent="-171450" algn="l" defTabSz="914400" rtl="0" eaLnBrk="1" fontAlgn="auto" latinLnBrk="0" hangingPunct="1">
-              <a:lnSpc>
-                <a:spcPct val="100000"/>
-              </a:lnSpc>
-              <a:spcBef>
-                <a:spcPts val="0"/>
-              </a:spcBef>
-              <a:spcAft>
-                <a:spcPts val="0"/>
-              </a:spcAft>
-              <a:buClrTx/>
-              <a:buSzTx/>
-              <a:buFontTx/>
-              <a:buChar char="-"/>
-              <a:tabLst/>
-              <a:defRPr/>
-            </a:pPr>
-            <a:r>
-              <a:rPr lang="en-US" b="0" i="0" dirty="0" err="1">
-                <a:solidFill>
-                  <a:srgbClr val="ECECEC"/>
-                </a:solidFill>
-                <a:effectLst/>
-                <a:latin typeface="Google Sans"/>
-              </a:rPr>
-              <a:t>ver</a:t>
-            </a:r>
-            <a:r>
-              <a:rPr lang="en-US" b="0" i="0" dirty="0">
-                <a:solidFill>
-                  <a:srgbClr val="ECECEC"/>
-                </a:solidFill>
-                <a:effectLst/>
-                <a:latin typeface="Google Sans"/>
-              </a:rPr>
-              <a:t> 1: </a:t>
-            </a:r>
-            <a:r>
-              <a:rPr lang="en-US" b="0" i="0" dirty="0" err="1">
-                <a:solidFill>
-                  <a:srgbClr val="ECECEC"/>
-                </a:solidFill>
-                <a:effectLst/>
-                <a:latin typeface="Google Sans"/>
-              </a:rPr>
-              <a:t>toru_dur</a:t>
-            </a:r>
-            <a:r>
-              <a:rPr lang="en-US" b="0" i="0" dirty="0">
-                <a:solidFill>
-                  <a:srgbClr val="ECECEC"/>
-                </a:solidFill>
-                <a:effectLst/>
-                <a:latin typeface="Google Sans"/>
-              </a:rPr>
-              <a:t> origin and toru_f0 origin</a:t>
-            </a:r>
-          </a:p>
-          <a:p>
-            <a:pPr marL="628650" marR="0" lvl="1" indent="-171450" algn="l" defTabSz="914400" rtl="0" eaLnBrk="1" fontAlgn="auto" latinLnBrk="0" hangingPunct="1">
-              <a:lnSpc>
-                <a:spcPct val="100000"/>
-              </a:lnSpc>
-              <a:spcBef>
-                <a:spcPts val="0"/>
-              </a:spcBef>
-              <a:spcAft>
-                <a:spcPts val="0"/>
-              </a:spcAft>
-              <a:buClrTx/>
-              <a:buSzTx/>
-              <a:buFontTx/>
-              <a:buChar char="-"/>
-              <a:tabLst/>
-              <a:defRPr/>
-            </a:pPr>
-            <a:r>
-              <a:rPr lang="en-US" b="0" i="0" dirty="0" err="1">
-                <a:solidFill>
-                  <a:srgbClr val="ECECEC"/>
-                </a:solidFill>
-                <a:effectLst/>
-                <a:latin typeface="Google Sans"/>
-              </a:rPr>
-              <a:t>ver</a:t>
-            </a:r>
-            <a:r>
-              <a:rPr lang="en-US" b="0" i="0" dirty="0">
-                <a:solidFill>
-                  <a:srgbClr val="ECECEC"/>
-                </a:solidFill>
-                <a:effectLst/>
-                <a:latin typeface="Google Sans"/>
-              </a:rPr>
-              <a:t> 2: </a:t>
-            </a:r>
-            <a:r>
-              <a:rPr lang="en-US" b="0" i="0" dirty="0" err="1">
-                <a:solidFill>
-                  <a:srgbClr val="ECECEC"/>
-                </a:solidFill>
-                <a:effectLst/>
-                <a:latin typeface="Google Sans"/>
-              </a:rPr>
-              <a:t>tooru_dur</a:t>
-            </a:r>
-            <a:r>
-              <a:rPr lang="en-US" b="0" i="0" dirty="0">
-                <a:solidFill>
-                  <a:srgbClr val="ECECEC"/>
-                </a:solidFill>
-                <a:effectLst/>
-                <a:latin typeface="Google Sans"/>
-              </a:rPr>
-              <a:t> origin and tooru_f0 origin</a:t>
-            </a:r>
-          </a:p>
-          <a:p>
-            <a:pPr marL="628650" marR="0" lvl="1" indent="-171450" algn="l" defTabSz="914400" rtl="0" eaLnBrk="1" fontAlgn="auto" latinLnBrk="0" hangingPunct="1">
-              <a:lnSpc>
-                <a:spcPct val="100000"/>
-              </a:lnSpc>
-              <a:spcBef>
-                <a:spcPts val="0"/>
-              </a:spcBef>
-              <a:spcAft>
-                <a:spcPts val="0"/>
-              </a:spcAft>
-              <a:buClrTx/>
-              <a:buSzTx/>
-              <a:buFontTx/>
-              <a:buChar char="-"/>
-              <a:tabLst/>
-              <a:defRPr/>
-            </a:pPr>
-            <a:r>
-              <a:rPr lang="en-US" b="0" i="0" dirty="0">
-                <a:solidFill>
-                  <a:srgbClr val="ECECEC"/>
-                </a:solidFill>
-                <a:effectLst/>
-                <a:latin typeface="Google Sans"/>
-              </a:rPr>
-              <a:t>then I will make a matrix of the final 35 stimuli that will be used that attempts to equally use stimuli between the two versions</a:t>
-            </a:r>
-          </a:p>
-          <a:p>
-            <a:pPr marL="628650" marR="0" lvl="1" indent="-171450" algn="l" defTabSz="914400" rtl="0" eaLnBrk="1" fontAlgn="auto" latinLnBrk="0" hangingPunct="1">
-              <a:lnSpc>
-                <a:spcPct val="100000"/>
-              </a:lnSpc>
-              <a:spcBef>
-                <a:spcPts val="0"/>
-              </a:spcBef>
-              <a:spcAft>
-                <a:spcPts val="0"/>
-              </a:spcAft>
-              <a:buClrTx/>
-              <a:buSzTx/>
-              <a:buFontTx/>
-              <a:buChar char="-"/>
-              <a:tabLst/>
-              <a:defRPr/>
-            </a:pPr>
-            <a:endParaRPr lang="en-US" b="0" i="0" dirty="0">
-              <a:solidFill>
-                <a:srgbClr val="ECECEC"/>
-              </a:solidFill>
-              <a:effectLst/>
-              <a:latin typeface="Google Sans"/>
-            </a:endParaRPr>
-          </a:p>
-          <a:p>
-            <a:pPr marL="628650" marR="0" lvl="1" indent="-171450" algn="l" defTabSz="914400" rtl="0" eaLnBrk="1" fontAlgn="auto" latinLnBrk="0" hangingPunct="1">
-              <a:lnSpc>
-                <a:spcPct val="100000"/>
-              </a:lnSpc>
-              <a:spcBef>
-                <a:spcPts val="0"/>
-              </a:spcBef>
-              <a:spcAft>
-                <a:spcPts val="0"/>
-              </a:spcAft>
-              <a:buClrTx/>
-              <a:buSzTx/>
-              <a:buFontTx/>
-              <a:buChar char="-"/>
-              <a:tabLst/>
-              <a:defRPr/>
-            </a:pPr>
-            <a:r>
-              <a:rPr lang="en-US" b="0" i="0" dirty="0">
-                <a:solidFill>
-                  <a:srgbClr val="ECECEC"/>
-                </a:solidFill>
-                <a:effectLst/>
-                <a:latin typeface="Google Sans"/>
-              </a:rPr>
-              <a:t>very important note: the F0 continua at dur_1 and dur_7 are derived from the base files toru_2_mod.wav and tooru_1_mod.wav respectively, rather than the endpoints that were created from making the duration continuum</a:t>
-            </a:r>
-          </a:p>
-          <a:p>
-            <a:pPr marL="628650" marR="0" lvl="1" indent="-171450" algn="l" defTabSz="914400" rtl="0" eaLnBrk="1" fontAlgn="auto" latinLnBrk="0" hangingPunct="1">
-              <a:lnSpc>
-                <a:spcPct val="100000"/>
-              </a:lnSpc>
-              <a:spcBef>
-                <a:spcPts val="0"/>
-              </a:spcBef>
-              <a:spcAft>
-                <a:spcPts val="0"/>
-              </a:spcAft>
-              <a:buClrTx/>
-              <a:buSzTx/>
-              <a:buFontTx/>
-              <a:buChar char="-"/>
-              <a:tabLst/>
-              <a:defRPr/>
-            </a:pPr>
-            <a:r>
-              <a:rPr lang="en-US" b="0" i="0" dirty="0">
-                <a:solidFill>
-                  <a:srgbClr val="ECECEC"/>
-                </a:solidFill>
-                <a:effectLst/>
-                <a:latin typeface="Google Sans"/>
-              </a:rPr>
-              <a:t>the F0 continua at dur_2, dur_3, and dur_4 were derived from the </a:t>
-            </a:r>
-            <a:r>
-              <a:rPr lang="en-US" b="0" i="0" dirty="0" err="1">
-                <a:solidFill>
-                  <a:srgbClr val="ECECEC"/>
-                </a:solidFill>
-                <a:effectLst/>
-                <a:latin typeface="Google Sans"/>
-              </a:rPr>
-              <a:t>toru_origin</a:t>
-            </a:r>
-            <a:r>
-              <a:rPr lang="en-US" b="0" i="0" dirty="0">
-                <a:solidFill>
-                  <a:srgbClr val="ECECEC"/>
-                </a:solidFill>
-                <a:effectLst/>
-                <a:latin typeface="Google Sans"/>
-              </a:rPr>
-              <a:t> duration continuum sounds</a:t>
-            </a:r>
-          </a:p>
-          <a:p>
-            <a:pPr marL="628650" marR="0" lvl="1" indent="-171450" algn="l" defTabSz="914400" rtl="0" eaLnBrk="1" fontAlgn="auto" latinLnBrk="0" hangingPunct="1">
-              <a:lnSpc>
-                <a:spcPct val="100000"/>
-              </a:lnSpc>
-              <a:spcBef>
-                <a:spcPts val="0"/>
-              </a:spcBef>
-              <a:spcAft>
-                <a:spcPts val="0"/>
-              </a:spcAft>
-              <a:buClrTx/>
-              <a:buSzTx/>
-              <a:buFontTx/>
-              <a:buChar char="-"/>
-              <a:tabLst/>
-              <a:defRPr/>
-            </a:pPr>
-            <a:r>
-              <a:rPr lang="en-US" b="0" i="0" dirty="0">
-                <a:solidFill>
-                  <a:srgbClr val="ECECEC"/>
-                </a:solidFill>
-                <a:effectLst/>
-                <a:latin typeface="Google Sans"/>
-              </a:rPr>
-              <a:t>the F0 continua at dur_4, dur_5, and dur_6 were derived from the </a:t>
-            </a:r>
-            <a:r>
-              <a:rPr lang="en-US" b="0" i="0" dirty="0" err="1">
-                <a:solidFill>
-                  <a:srgbClr val="ECECEC"/>
-                </a:solidFill>
-                <a:effectLst/>
-                <a:latin typeface="Google Sans"/>
-              </a:rPr>
-              <a:t>tooru_origin</a:t>
-            </a:r>
-            <a:r>
-              <a:rPr lang="en-US" b="0" i="0" dirty="0">
-                <a:solidFill>
-                  <a:srgbClr val="ECECEC"/>
-                </a:solidFill>
-                <a:effectLst/>
-                <a:latin typeface="Google Sans"/>
-              </a:rPr>
-              <a:t> duration continuum sounds</a:t>
-            </a:r>
-          </a:p>
-          <a:p>
-            <a:pPr marL="628650" marR="0" lvl="1" indent="-171450" algn="l" defTabSz="914400" rtl="0" eaLnBrk="1" fontAlgn="auto" latinLnBrk="0" hangingPunct="1">
-              <a:lnSpc>
-                <a:spcPct val="100000"/>
-              </a:lnSpc>
-              <a:spcBef>
-                <a:spcPts val="0"/>
-              </a:spcBef>
-              <a:spcAft>
-                <a:spcPts val="0"/>
-              </a:spcAft>
-              <a:buClrTx/>
-              <a:buSzTx/>
-              <a:buFontTx/>
-              <a:buChar char="-"/>
-              <a:tabLst/>
-              <a:defRPr/>
-            </a:pPr>
-            <a:r>
-              <a:rPr lang="en-US" b="0" i="0" dirty="0">
-                <a:solidFill>
-                  <a:srgbClr val="ECECEC"/>
-                </a:solidFill>
-                <a:effectLst/>
-                <a:latin typeface="Google Sans"/>
-              </a:rPr>
-              <a:t>so there are two versions of F0 continua at dur_4 step</a:t>
-            </a:r>
-          </a:p>
-          <a:p>
-            <a:pPr marL="628650" marR="0" lvl="1" indent="-171450" algn="l" defTabSz="914400" rtl="0" eaLnBrk="1" fontAlgn="auto" latinLnBrk="0" hangingPunct="1">
-              <a:lnSpc>
-                <a:spcPct val="100000"/>
-              </a:lnSpc>
-              <a:spcBef>
-                <a:spcPts val="0"/>
-              </a:spcBef>
-              <a:spcAft>
-                <a:spcPts val="0"/>
-              </a:spcAft>
-              <a:buClrTx/>
-              <a:buSzTx/>
-              <a:buFontTx/>
-              <a:buChar char="-"/>
-              <a:tabLst/>
-              <a:defRPr/>
-            </a:pPr>
-            <a:r>
-              <a:rPr lang="en-US" b="0" i="0" dirty="0">
-                <a:solidFill>
-                  <a:srgbClr val="ECECEC"/>
-                </a:solidFill>
-                <a:effectLst/>
-                <a:latin typeface="Google Sans"/>
-              </a:rPr>
-              <a:t>I will choose whether the sounds of the F0 continuum at dur_4 will be from the </a:t>
-            </a:r>
-            <a:r>
-              <a:rPr lang="en-US" b="0" i="0" dirty="0" err="1">
-                <a:solidFill>
-                  <a:srgbClr val="ECECEC"/>
-                </a:solidFill>
-                <a:effectLst/>
-                <a:latin typeface="Google Sans"/>
-              </a:rPr>
-              <a:t>toru_origin</a:t>
-            </a:r>
-            <a:r>
-              <a:rPr lang="en-US" b="0" i="0" dirty="0">
-                <a:solidFill>
-                  <a:srgbClr val="ECECEC"/>
-                </a:solidFill>
-                <a:effectLst/>
-                <a:latin typeface="Google Sans"/>
-              </a:rPr>
-              <a:t> or </a:t>
-            </a:r>
-            <a:r>
-              <a:rPr lang="en-US" b="0" i="0" dirty="0" err="1">
-                <a:solidFill>
-                  <a:srgbClr val="ECECEC"/>
-                </a:solidFill>
-                <a:effectLst/>
-                <a:latin typeface="Google Sans"/>
-              </a:rPr>
-              <a:t>tooru_origin</a:t>
-            </a:r>
-            <a:r>
-              <a:rPr lang="en-US" b="0" i="0" dirty="0">
-                <a:solidFill>
-                  <a:srgbClr val="ECECEC"/>
-                </a:solidFill>
-                <a:effectLst/>
-                <a:latin typeface="Google Sans"/>
-              </a:rPr>
-              <a:t> version</a:t>
-            </a:r>
-          </a:p>
-          <a:p>
-            <a:pPr marL="628650" marR="0" lvl="1" indent="-171450" algn="l" defTabSz="914400" rtl="0" eaLnBrk="1" fontAlgn="auto" latinLnBrk="0" hangingPunct="1">
-              <a:lnSpc>
-                <a:spcPct val="100000"/>
-              </a:lnSpc>
-              <a:spcBef>
-                <a:spcPts val="0"/>
-              </a:spcBef>
-              <a:spcAft>
-                <a:spcPts val="0"/>
-              </a:spcAft>
-              <a:buClrTx/>
-              <a:buSzTx/>
-              <a:buFontTx/>
-              <a:buChar char="-"/>
-              <a:tabLst/>
-              <a:defRPr/>
-            </a:pPr>
-            <a:r>
-              <a:rPr lang="en-US" b="0" i="0" dirty="0">
-                <a:solidFill>
-                  <a:srgbClr val="ECECEC"/>
-                </a:solidFill>
-                <a:effectLst/>
-                <a:latin typeface="Google Sans"/>
-              </a:rPr>
-              <a:t>for dur_4, I will probably use </a:t>
-            </a:r>
-            <a:r>
-              <a:rPr lang="en-US" b="0" i="0" dirty="0" err="1">
-                <a:solidFill>
-                  <a:srgbClr val="ECECEC"/>
-                </a:solidFill>
-                <a:effectLst/>
-                <a:latin typeface="Google Sans"/>
-              </a:rPr>
-              <a:t>toru_origin</a:t>
-            </a:r>
-            <a:r>
-              <a:rPr lang="en-US" b="0" i="0" dirty="0">
-                <a:solidFill>
-                  <a:srgbClr val="ECECEC"/>
-                </a:solidFill>
-                <a:effectLst/>
-                <a:latin typeface="Google Sans"/>
-              </a:rPr>
-              <a:t> for F0_1, F0_2, and maybe F0_3, and then </a:t>
-            </a:r>
-            <a:r>
-              <a:rPr lang="en-US" b="0" i="0" dirty="0" err="1">
-                <a:solidFill>
-                  <a:srgbClr val="ECECEC"/>
-                </a:solidFill>
-                <a:effectLst/>
-                <a:latin typeface="Google Sans"/>
-              </a:rPr>
-              <a:t>tooru_origin</a:t>
-            </a:r>
-            <a:r>
-              <a:rPr lang="en-US" b="0" i="0" dirty="0">
-                <a:solidFill>
-                  <a:srgbClr val="ECECEC"/>
-                </a:solidFill>
-                <a:effectLst/>
-                <a:latin typeface="Google Sans"/>
-              </a:rPr>
-              <a:t> for F0_4 and F0_5, and maybe F0_3</a:t>
-            </a:r>
-          </a:p>
-          <a:p>
-            <a:pPr marL="628650" marR="0" lvl="1" indent="-171450" algn="l" defTabSz="914400" rtl="0" eaLnBrk="1" fontAlgn="auto" latinLnBrk="0" hangingPunct="1">
-              <a:lnSpc>
-                <a:spcPct val="100000"/>
-              </a:lnSpc>
-              <a:spcBef>
-                <a:spcPts val="0"/>
-              </a:spcBef>
-              <a:spcAft>
-                <a:spcPts val="0"/>
-              </a:spcAft>
-              <a:buClrTx/>
-              <a:buSzTx/>
-              <a:buFontTx/>
-              <a:buChar char="-"/>
-              <a:tabLst/>
-              <a:defRPr/>
-            </a:pPr>
-            <a:r>
-              <a:rPr lang="en-US" b="0" i="0" dirty="0">
-                <a:solidFill>
-                  <a:srgbClr val="ECECEC"/>
-                </a:solidFill>
-                <a:effectLst/>
-                <a:latin typeface="Google Sans"/>
-              </a:rPr>
-              <a:t>***final choices, from my own ear: I will use </a:t>
-            </a:r>
-            <a:r>
-              <a:rPr lang="en-US" b="0" i="0" dirty="0" err="1">
-                <a:solidFill>
-                  <a:srgbClr val="ECECEC"/>
-                </a:solidFill>
-                <a:effectLst/>
-                <a:latin typeface="Google Sans"/>
-              </a:rPr>
-              <a:t>toru_origin</a:t>
-            </a:r>
-            <a:r>
-              <a:rPr lang="en-US" b="0" i="0" dirty="0">
-                <a:solidFill>
-                  <a:srgbClr val="ECECEC"/>
-                </a:solidFill>
-                <a:effectLst/>
-                <a:latin typeface="Google Sans"/>
-              </a:rPr>
-              <a:t> for dur_4_F0_1, and </a:t>
-            </a:r>
-            <a:r>
-              <a:rPr lang="en-US" b="0" i="0" dirty="0" err="1">
-                <a:solidFill>
-                  <a:srgbClr val="ECECEC"/>
-                </a:solidFill>
-                <a:effectLst/>
-                <a:latin typeface="Google Sans"/>
-              </a:rPr>
-              <a:t>tooru_origin</a:t>
-            </a:r>
-            <a:r>
-              <a:rPr lang="en-US" b="0" i="0" dirty="0">
-                <a:solidFill>
-                  <a:srgbClr val="ECECEC"/>
-                </a:solidFill>
-                <a:effectLst/>
-                <a:latin typeface="Google Sans"/>
-              </a:rPr>
-              <a:t> for the rest of dur_4 series (F0_2, F0_3, F0_4, F0_5) – these just sounded more natural from </a:t>
-            </a:r>
-            <a:r>
-              <a:rPr lang="en-US" b="0" i="0" dirty="0" err="1">
-                <a:solidFill>
-                  <a:srgbClr val="ECECEC"/>
-                </a:solidFill>
-                <a:effectLst/>
-                <a:latin typeface="Google Sans"/>
-              </a:rPr>
-              <a:t>tooru_origin</a:t>
-            </a:r>
-            <a:r>
-              <a:rPr lang="en-US" b="0" i="0" dirty="0">
-                <a:solidFill>
-                  <a:srgbClr val="ECECEC"/>
-                </a:solidFill>
-                <a:effectLst/>
-                <a:latin typeface="Google Sans"/>
-              </a:rPr>
-              <a:t>, while only F0_1 sounded more natural from </a:t>
-            </a:r>
-            <a:r>
-              <a:rPr lang="en-US" b="0" i="0" dirty="0" err="1">
-                <a:solidFill>
-                  <a:srgbClr val="ECECEC"/>
-                </a:solidFill>
-                <a:effectLst/>
-                <a:latin typeface="Google Sans"/>
-              </a:rPr>
-              <a:t>toru_origin</a:t>
-            </a:r>
-            <a:r>
-              <a:rPr lang="en-US" b="0" i="0" dirty="0">
-                <a:solidFill>
-                  <a:srgbClr val="ECECEC"/>
-                </a:solidFill>
-                <a:effectLst/>
-                <a:latin typeface="Google Sans"/>
-              </a:rPr>
-              <a:t> (only slightly) – see the next slide</a:t>
-            </a:r>
-            <a:endParaRPr lang="en-US" dirty="0">
-              <a:solidFill>
-                <a:srgbClr val="000000"/>
-              </a:solidFill>
-              <a:effectLst/>
-              <a:latin typeface="Menlo" panose="020B0609030804020204" pitchFamily="49" charset="0"/>
-            </a:endParaRPr>
-          </a:p>
-          <a:p>
-            <a:pPr marL="171450" indent="-171450">
-              <a:buFontTx/>
-              <a:buChar char="-"/>
-            </a:pPr>
-            <a:endParaRPr lang="en-US" dirty="0"/>
-          </a:p>
-        </p:txBody>
-      </p:sp>
-      <p:sp>
-        <p:nvSpPr>
-          <p:cNvPr id="4" name="Slide Number Placeholder 3"/>
-          <p:cNvSpPr>
-            <a:spLocks noGrp="1"/>
-          </p:cNvSpPr>
-          <p:nvPr>
-            <p:ph type="sldNum" sz="quarter" idx="5"/>
-          </p:nvPr>
-        </p:nvSpPr>
-        <p:spPr/>
-        <p:txBody>
-          <a:bodyPr/>
-          <a:lstStyle/>
-          <a:p>
-            <a:fld id="{8D84D065-75B2-C547-A1E0-43719E6097C2}" type="slidenum">
-              <a:rPr lang="en-US" smtClean="0"/>
-              <a:t>33</a:t>
-            </a:fld>
-            <a:endParaRPr lang="en-US"/>
-          </a:p>
-        </p:txBody>
-      </p:sp>
-    </p:spTree>
-    <p:extLst>
-      <p:ext uri="{BB962C8B-B14F-4D97-AF65-F5344CB8AC3E}">
-        <p14:creationId xmlns:p14="http://schemas.microsoft.com/office/powerpoint/2010/main" val="1750055933"/>
       </p:ext>
     </p:extLst>
   </p:cSld>
@@ -2540,16 +1550,997 @@
           <a:bodyPr/>
           <a:lstStyle/>
           <a:p>
-            <a:r>
-              <a:rPr lang="en-US" dirty="0"/>
-              <a:t>final picks for toru-tooru</a:t>
-            </a:r>
-          </a:p>
-          <a:p>
-            <a:r>
-              <a:rPr lang="en-US" dirty="0"/>
-              <a:t>Final stimuli choices for Vowel Duration x Pitch Contour continuum matrix </a:t>
-            </a:r>
+            <a:pPr marL="171450" indent="-171450">
+              <a:buFontTx/>
+              <a:buChar char="-"/>
+            </a:pPr>
+            <a:r>
+              <a:rPr lang="en-US" dirty="0"/>
+              <a:t>Notes:</a:t>
+            </a:r>
+          </a:p>
+          <a:p>
+            <a:pPr marL="171450" indent="-171450">
+              <a:buFontTx/>
+              <a:buChar char="-"/>
+            </a:pPr>
+            <a:r>
+              <a:rPr lang="en-US" dirty="0"/>
+              <a:t>the exact wav files used in this manipulation were toru_2_mod.wav and tooru_1_mod.wav – within Praat, I renamed them </a:t>
+            </a:r>
+            <a:r>
+              <a:rPr lang="en-US" dirty="0" err="1"/>
+              <a:t>toru</a:t>
+            </a:r>
+            <a:r>
+              <a:rPr lang="en-US" dirty="0"/>
+              <a:t> and </a:t>
+            </a:r>
+            <a:r>
+              <a:rPr lang="en-US" dirty="0" err="1"/>
+              <a:t>tooru</a:t>
+            </a:r>
+            <a:r>
+              <a:rPr lang="en-US" dirty="0"/>
+              <a:t> to make the naming process of the continua files easier</a:t>
+            </a:r>
+          </a:p>
+          <a:p>
+            <a:pPr marL="171450" indent="-171450">
+              <a:buFontTx/>
+              <a:buChar char="-"/>
+            </a:pPr>
+            <a:r>
+              <a:rPr lang="en-US" dirty="0"/>
+              <a:t>first I will make two equivalent duration continua, one that starts from each endpoint (of JUST the vowel length – C1, C2, and V2 duration will remain constant)</a:t>
+            </a:r>
+          </a:p>
+          <a:p>
+            <a:pPr marL="171450" indent="-171450">
+              <a:buFontTx/>
+              <a:buChar char="-"/>
+            </a:pPr>
+            <a:r>
+              <a:rPr lang="en-US" dirty="0"/>
+              <a:t>then I will interpolate pitch between the endpoints of equivalent duration (this includes pitch across V1 and V2)</a:t>
+            </a:r>
+          </a:p>
+          <a:p>
+            <a:pPr marL="171450" indent="-171450">
+              <a:buFontTx/>
+              <a:buChar char="-"/>
+            </a:pPr>
+            <a:r>
+              <a:rPr lang="en-US" dirty="0"/>
+              <a:t>because of the creaks at the end of the word (at the end of V2), I chose to edit out the last of the creaky voice where the regularity of the periodicity breaks down, and then replace it with 50ms of silence (specifically I concatenated with overlap, with the overlap being 1 ms (0.001 s)</a:t>
+            </a:r>
+          </a:p>
+          <a:p>
+            <a:pPr marL="171450" indent="-171450">
+              <a:buFontTx/>
+              <a:buChar char="-"/>
+            </a:pPr>
+            <a:r>
+              <a:rPr lang="en-US" dirty="0"/>
+              <a:t>I did this for both </a:t>
+            </a:r>
+            <a:r>
+              <a:rPr lang="en-US" dirty="0" err="1"/>
+              <a:t>toru</a:t>
+            </a:r>
+            <a:r>
+              <a:rPr lang="en-US" dirty="0"/>
+              <a:t> and </a:t>
+            </a:r>
+            <a:r>
+              <a:rPr lang="en-US" dirty="0" err="1"/>
+              <a:t>tooru</a:t>
+            </a:r>
+            <a:r>
+              <a:rPr lang="en-US" dirty="0"/>
+              <a:t>, and both are now called toru_2_mod.wav and tooru_1_mod.wav respectively – this works better for the pulse tracking on the manipulation object for the pitch and duration manipulations</a:t>
+            </a:r>
+          </a:p>
+          <a:p>
+            <a:pPr marL="171450" indent="-171450">
+              <a:buFontTx/>
+              <a:buChar char="-"/>
+            </a:pPr>
+            <a:r>
+              <a:rPr lang="en-US" dirty="0"/>
+              <a:t>I also had to adjust the silence at the beginning so that the start of the two words would be aligned and thus each of the duration manipulated steps (made from each starting point – continuum steps made from </a:t>
+            </a:r>
+            <a:r>
+              <a:rPr lang="en-US" dirty="0" err="1"/>
+              <a:t>toru</a:t>
+            </a:r>
+            <a:r>
+              <a:rPr lang="en-US" dirty="0"/>
+              <a:t> and continuum steps made from </a:t>
+            </a:r>
+            <a:r>
+              <a:rPr lang="en-US" dirty="0" err="1"/>
+              <a:t>tooru</a:t>
+            </a:r>
+            <a:r>
+              <a:rPr lang="en-US" dirty="0"/>
+              <a:t>) would also be aligned in order to properly do the pitch manipulation</a:t>
+            </a:r>
+          </a:p>
+          <a:p>
+            <a:pPr marL="171450" marR="0" lvl="0" indent="-171450" algn="l" defTabSz="914400" rtl="0" eaLnBrk="1" fontAlgn="auto" latinLnBrk="0" hangingPunct="1">
+              <a:lnSpc>
+                <a:spcPct val="100000"/>
+              </a:lnSpc>
+              <a:spcBef>
+                <a:spcPts val="0"/>
+              </a:spcBef>
+              <a:spcAft>
+                <a:spcPts val="0"/>
+              </a:spcAft>
+              <a:buClrTx/>
+              <a:buSzTx/>
+              <a:buFontTx/>
+              <a:buChar char="-"/>
+              <a:tabLst/>
+              <a:defRPr/>
+            </a:pPr>
+            <a:r>
+              <a:rPr lang="en-US" dirty="0"/>
+              <a:t>tooru_1_mod.wav had </a:t>
+            </a:r>
+            <a:r>
+              <a:rPr lang="en-US" dirty="0">
+                <a:solidFill>
+                  <a:srgbClr val="000000"/>
+                </a:solidFill>
+                <a:effectLst/>
+                <a:latin typeface="Menlo" panose="020B0609030804020204" pitchFamily="49" charset="0"/>
+              </a:rPr>
+              <a:t>0.050226757369614516 s before the start of the word</a:t>
+            </a:r>
+          </a:p>
+          <a:p>
+            <a:pPr marL="171450" marR="0" lvl="0" indent="-171450" algn="l" defTabSz="914400" rtl="0" eaLnBrk="1" fontAlgn="auto" latinLnBrk="0" hangingPunct="1">
+              <a:lnSpc>
+                <a:spcPct val="100000"/>
+              </a:lnSpc>
+              <a:spcBef>
+                <a:spcPts val="0"/>
+              </a:spcBef>
+              <a:spcAft>
+                <a:spcPts val="0"/>
+              </a:spcAft>
+              <a:buClrTx/>
+              <a:buSzTx/>
+              <a:buFontTx/>
+              <a:buChar char="-"/>
+              <a:tabLst/>
+              <a:defRPr/>
+            </a:pPr>
+            <a:r>
+              <a:rPr lang="en-US" dirty="0">
+                <a:solidFill>
+                  <a:srgbClr val="000000"/>
+                </a:solidFill>
+                <a:effectLst/>
+                <a:latin typeface="Menlo" panose="020B0609030804020204" pitchFamily="49" charset="0"/>
+              </a:rPr>
+              <a:t>toru_2_mod.wav had 0.026341107871720115 s before the start of the word</a:t>
+            </a:r>
+          </a:p>
+          <a:p>
+            <a:pPr marL="171450" marR="0" lvl="0" indent="-171450" algn="l" defTabSz="914400" rtl="0" eaLnBrk="1" fontAlgn="auto" latinLnBrk="0" hangingPunct="1">
+              <a:lnSpc>
+                <a:spcPct val="100000"/>
+              </a:lnSpc>
+              <a:spcBef>
+                <a:spcPts val="0"/>
+              </a:spcBef>
+              <a:spcAft>
+                <a:spcPts val="0"/>
+              </a:spcAft>
+              <a:buClrTx/>
+              <a:buSzTx/>
+              <a:buFontTx/>
+              <a:buChar char="-"/>
+              <a:tabLst/>
+              <a:defRPr/>
+            </a:pPr>
+            <a:r>
+              <a:rPr lang="en-US" dirty="0">
+                <a:solidFill>
+                  <a:srgbClr val="000000"/>
+                </a:solidFill>
+                <a:effectLst/>
+                <a:latin typeface="Menlo" panose="020B0609030804020204" pitchFamily="49" charset="0"/>
+              </a:rPr>
+              <a:t>so I added </a:t>
+            </a:r>
+            <a:r>
+              <a:rPr lang="en-US" b="0" i="0" dirty="0">
+                <a:solidFill>
+                  <a:srgbClr val="ECECEC"/>
+                </a:solidFill>
+                <a:effectLst/>
+                <a:latin typeface="Google Sans"/>
+              </a:rPr>
+              <a:t>0.02388564949 s to the start of toru_2_mod.wav and the corresponding text grid (new text grid is saved as toru_2_mod.TextGrid)</a:t>
+            </a:r>
+          </a:p>
+          <a:p>
+            <a:pPr marL="171450" marR="0" lvl="0" indent="-171450" algn="l" defTabSz="914400" rtl="0" eaLnBrk="1" fontAlgn="auto" latinLnBrk="0" hangingPunct="1">
+              <a:lnSpc>
+                <a:spcPct val="100000"/>
+              </a:lnSpc>
+              <a:spcBef>
+                <a:spcPts val="0"/>
+              </a:spcBef>
+              <a:spcAft>
+                <a:spcPts val="0"/>
+              </a:spcAft>
+              <a:buClrTx/>
+              <a:buSzTx/>
+              <a:buFontTx/>
+              <a:buChar char="-"/>
+              <a:tabLst/>
+              <a:defRPr/>
+            </a:pPr>
+            <a:r>
+              <a:rPr lang="en-US" b="0" i="0" dirty="0">
+                <a:solidFill>
+                  <a:srgbClr val="ECECEC"/>
+                </a:solidFill>
+                <a:effectLst/>
+                <a:latin typeface="Google Sans"/>
+              </a:rPr>
+              <a:t>I made two versions of all 35 tokens (7 dur x 5 F0), since the duration and F0 manipulations done on Praat can only be done using one word as the origin word and then interpolate to the </a:t>
+            </a:r>
+            <a:r>
+              <a:rPr lang="en-US" b="0" i="1" dirty="0">
+                <a:solidFill>
+                  <a:srgbClr val="ECECEC"/>
+                </a:solidFill>
+                <a:effectLst/>
+                <a:latin typeface="Google Sans"/>
+              </a:rPr>
+              <a:t>values</a:t>
+            </a:r>
+            <a:r>
+              <a:rPr lang="en-US" b="0" i="0" dirty="0">
+                <a:solidFill>
+                  <a:srgbClr val="ECECEC"/>
+                </a:solidFill>
+                <a:effectLst/>
+                <a:latin typeface="Google Sans"/>
+              </a:rPr>
+              <a:t> of the other word – i.e., manipulations are only being done using one sound file as the origin, not a merge between the two</a:t>
+            </a:r>
+          </a:p>
+          <a:p>
+            <a:pPr marL="628650" marR="0" lvl="1" indent="-171450" algn="l" defTabSz="914400" rtl="0" eaLnBrk="1" fontAlgn="auto" latinLnBrk="0" hangingPunct="1">
+              <a:lnSpc>
+                <a:spcPct val="100000"/>
+              </a:lnSpc>
+              <a:spcBef>
+                <a:spcPts val="0"/>
+              </a:spcBef>
+              <a:spcAft>
+                <a:spcPts val="0"/>
+              </a:spcAft>
+              <a:buClrTx/>
+              <a:buSzTx/>
+              <a:buFontTx/>
+              <a:buChar char="-"/>
+              <a:tabLst/>
+              <a:defRPr/>
+            </a:pPr>
+            <a:r>
+              <a:rPr lang="en-US" b="0" i="0" dirty="0">
+                <a:solidFill>
+                  <a:srgbClr val="ECECEC"/>
+                </a:solidFill>
+                <a:effectLst/>
+                <a:latin typeface="Google Sans"/>
+              </a:rPr>
+              <a:t>first I made two duration continua, one that is </a:t>
+            </a:r>
+            <a:r>
+              <a:rPr lang="en-US" b="0" i="0" dirty="0" err="1">
+                <a:solidFill>
+                  <a:srgbClr val="ECECEC"/>
+                </a:solidFill>
+                <a:effectLst/>
+                <a:latin typeface="Google Sans"/>
+              </a:rPr>
+              <a:t>toru_origin</a:t>
+            </a:r>
+            <a:r>
+              <a:rPr lang="en-US" b="0" i="0" dirty="0">
+                <a:solidFill>
+                  <a:srgbClr val="ECECEC"/>
+                </a:solidFill>
+                <a:effectLst/>
+                <a:latin typeface="Google Sans"/>
+              </a:rPr>
+              <a:t> and one that is </a:t>
+            </a:r>
+            <a:r>
+              <a:rPr lang="en-US" b="0" i="0" dirty="0" err="1">
+                <a:solidFill>
+                  <a:srgbClr val="ECECEC"/>
+                </a:solidFill>
+                <a:effectLst/>
+                <a:latin typeface="Google Sans"/>
+              </a:rPr>
+              <a:t>tooru_origin</a:t>
+            </a:r>
+            <a:endParaRPr lang="en-US" b="0" i="0" dirty="0">
+              <a:solidFill>
+                <a:srgbClr val="ECECEC"/>
+              </a:solidFill>
+              <a:effectLst/>
+              <a:latin typeface="Google Sans"/>
+            </a:endParaRPr>
+          </a:p>
+          <a:p>
+            <a:pPr marL="628650" marR="0" lvl="1" indent="-171450" algn="l" defTabSz="914400" rtl="0" eaLnBrk="1" fontAlgn="auto" latinLnBrk="0" hangingPunct="1">
+              <a:lnSpc>
+                <a:spcPct val="100000"/>
+              </a:lnSpc>
+              <a:spcBef>
+                <a:spcPts val="0"/>
+              </a:spcBef>
+              <a:spcAft>
+                <a:spcPts val="0"/>
+              </a:spcAft>
+              <a:buClrTx/>
+              <a:buSzTx/>
+              <a:buFontTx/>
+              <a:buChar char="-"/>
+              <a:tabLst/>
+              <a:defRPr/>
+            </a:pPr>
+            <a:r>
+              <a:rPr lang="en-US" b="0" i="0" dirty="0">
+                <a:solidFill>
+                  <a:srgbClr val="ECECEC"/>
+                </a:solidFill>
+                <a:effectLst/>
+                <a:latin typeface="Google Sans"/>
+              </a:rPr>
+              <a:t>then I will make two different F0 continua from each of these that interpolate the F0 contours between the equivalent duration steps of the </a:t>
+            </a:r>
+            <a:r>
+              <a:rPr lang="en-US" b="0" i="0" dirty="0" err="1">
+                <a:solidFill>
+                  <a:srgbClr val="ECECEC"/>
+                </a:solidFill>
+                <a:effectLst/>
+                <a:latin typeface="Google Sans"/>
+              </a:rPr>
+              <a:t>toru_origin</a:t>
+            </a:r>
+            <a:r>
+              <a:rPr lang="en-US" b="0" i="0" dirty="0">
+                <a:solidFill>
+                  <a:srgbClr val="ECECEC"/>
+                </a:solidFill>
+                <a:effectLst/>
+                <a:latin typeface="Google Sans"/>
+              </a:rPr>
+              <a:t> and </a:t>
+            </a:r>
+            <a:r>
+              <a:rPr lang="en-US" b="0" i="0" dirty="0" err="1">
+                <a:solidFill>
+                  <a:srgbClr val="ECECEC"/>
+                </a:solidFill>
+                <a:effectLst/>
+                <a:latin typeface="Google Sans"/>
+              </a:rPr>
+              <a:t>tooru_origin</a:t>
+            </a:r>
+            <a:r>
+              <a:rPr lang="en-US" b="0" i="0" dirty="0">
+                <a:solidFill>
+                  <a:srgbClr val="ECECEC"/>
+                </a:solidFill>
+                <a:effectLst/>
+                <a:latin typeface="Google Sans"/>
+              </a:rPr>
+              <a:t> continua</a:t>
+            </a:r>
+          </a:p>
+          <a:p>
+            <a:pPr marL="628650" marR="0" lvl="1" indent="-171450" algn="l" defTabSz="914400" rtl="0" eaLnBrk="1" fontAlgn="auto" latinLnBrk="0" hangingPunct="1">
+              <a:lnSpc>
+                <a:spcPct val="100000"/>
+              </a:lnSpc>
+              <a:spcBef>
+                <a:spcPts val="0"/>
+              </a:spcBef>
+              <a:spcAft>
+                <a:spcPts val="0"/>
+              </a:spcAft>
+              <a:buClrTx/>
+              <a:buSzTx/>
+              <a:buFontTx/>
+              <a:buChar char="-"/>
+              <a:tabLst/>
+              <a:defRPr/>
+            </a:pPr>
+            <a:r>
+              <a:rPr lang="en-US" b="0" i="0" dirty="0" err="1">
+                <a:solidFill>
+                  <a:srgbClr val="ECECEC"/>
+                </a:solidFill>
+                <a:effectLst/>
+                <a:latin typeface="Google Sans"/>
+              </a:rPr>
+              <a:t>ver</a:t>
+            </a:r>
+            <a:r>
+              <a:rPr lang="en-US" b="0" i="0" dirty="0">
+                <a:solidFill>
+                  <a:srgbClr val="ECECEC"/>
+                </a:solidFill>
+                <a:effectLst/>
+                <a:latin typeface="Google Sans"/>
+              </a:rPr>
+              <a:t> 1: </a:t>
+            </a:r>
+            <a:r>
+              <a:rPr lang="en-US" b="0" i="0" dirty="0" err="1">
+                <a:solidFill>
+                  <a:srgbClr val="ECECEC"/>
+                </a:solidFill>
+                <a:effectLst/>
+                <a:latin typeface="Google Sans"/>
+              </a:rPr>
+              <a:t>toru_dur</a:t>
+            </a:r>
+            <a:r>
+              <a:rPr lang="en-US" b="0" i="0" dirty="0">
+                <a:solidFill>
+                  <a:srgbClr val="ECECEC"/>
+                </a:solidFill>
+                <a:effectLst/>
+                <a:latin typeface="Google Sans"/>
+              </a:rPr>
+              <a:t> origin and toru_f0 origin</a:t>
+            </a:r>
+          </a:p>
+          <a:p>
+            <a:pPr marL="628650" marR="0" lvl="1" indent="-171450" algn="l" defTabSz="914400" rtl="0" eaLnBrk="1" fontAlgn="auto" latinLnBrk="0" hangingPunct="1">
+              <a:lnSpc>
+                <a:spcPct val="100000"/>
+              </a:lnSpc>
+              <a:spcBef>
+                <a:spcPts val="0"/>
+              </a:spcBef>
+              <a:spcAft>
+                <a:spcPts val="0"/>
+              </a:spcAft>
+              <a:buClrTx/>
+              <a:buSzTx/>
+              <a:buFontTx/>
+              <a:buChar char="-"/>
+              <a:tabLst/>
+              <a:defRPr/>
+            </a:pPr>
+            <a:r>
+              <a:rPr lang="en-US" b="0" i="0" dirty="0" err="1">
+                <a:solidFill>
+                  <a:srgbClr val="ECECEC"/>
+                </a:solidFill>
+                <a:effectLst/>
+                <a:latin typeface="Google Sans"/>
+              </a:rPr>
+              <a:t>ver</a:t>
+            </a:r>
+            <a:r>
+              <a:rPr lang="en-US" b="0" i="0" dirty="0">
+                <a:solidFill>
+                  <a:srgbClr val="ECECEC"/>
+                </a:solidFill>
+                <a:effectLst/>
+                <a:latin typeface="Google Sans"/>
+              </a:rPr>
+              <a:t> 2: </a:t>
+            </a:r>
+            <a:r>
+              <a:rPr lang="en-US" b="0" i="0" dirty="0" err="1">
+                <a:solidFill>
+                  <a:srgbClr val="ECECEC"/>
+                </a:solidFill>
+                <a:effectLst/>
+                <a:latin typeface="Google Sans"/>
+              </a:rPr>
+              <a:t>tooru_dur</a:t>
+            </a:r>
+            <a:r>
+              <a:rPr lang="en-US" b="0" i="0" dirty="0">
+                <a:solidFill>
+                  <a:srgbClr val="ECECEC"/>
+                </a:solidFill>
+                <a:effectLst/>
+                <a:latin typeface="Google Sans"/>
+              </a:rPr>
+              <a:t> origin and tooru_f0 origin</a:t>
+            </a:r>
+          </a:p>
+          <a:p>
+            <a:pPr marL="628650" marR="0" lvl="1" indent="-171450" algn="l" defTabSz="914400" rtl="0" eaLnBrk="1" fontAlgn="auto" latinLnBrk="0" hangingPunct="1">
+              <a:lnSpc>
+                <a:spcPct val="100000"/>
+              </a:lnSpc>
+              <a:spcBef>
+                <a:spcPts val="0"/>
+              </a:spcBef>
+              <a:spcAft>
+                <a:spcPts val="0"/>
+              </a:spcAft>
+              <a:buClrTx/>
+              <a:buSzTx/>
+              <a:buFontTx/>
+              <a:buChar char="-"/>
+              <a:tabLst/>
+              <a:defRPr/>
+            </a:pPr>
+            <a:r>
+              <a:rPr lang="en-US" b="0" i="0" dirty="0">
+                <a:solidFill>
+                  <a:srgbClr val="ECECEC"/>
+                </a:solidFill>
+                <a:effectLst/>
+                <a:latin typeface="Google Sans"/>
+              </a:rPr>
+              <a:t>then I will make a matrix of the final 35 stimuli that will be used that attempts to equally use stimuli between the two versions</a:t>
+            </a:r>
+          </a:p>
+          <a:p>
+            <a:pPr marL="628650" marR="0" lvl="1" indent="-171450" algn="l" defTabSz="914400" rtl="0" eaLnBrk="1" fontAlgn="auto" latinLnBrk="0" hangingPunct="1">
+              <a:lnSpc>
+                <a:spcPct val="100000"/>
+              </a:lnSpc>
+              <a:spcBef>
+                <a:spcPts val="0"/>
+              </a:spcBef>
+              <a:spcAft>
+                <a:spcPts val="0"/>
+              </a:spcAft>
+              <a:buClrTx/>
+              <a:buSzTx/>
+              <a:buFontTx/>
+              <a:buChar char="-"/>
+              <a:tabLst/>
+              <a:defRPr/>
+            </a:pPr>
+            <a:endParaRPr lang="en-US" b="0" i="0" dirty="0">
+              <a:solidFill>
+                <a:srgbClr val="ECECEC"/>
+              </a:solidFill>
+              <a:effectLst/>
+              <a:latin typeface="Google Sans"/>
+            </a:endParaRPr>
+          </a:p>
+          <a:p>
+            <a:pPr marL="628650" marR="0" lvl="1" indent="-171450" algn="l" defTabSz="914400" rtl="0" eaLnBrk="1" fontAlgn="auto" latinLnBrk="0" hangingPunct="1">
+              <a:lnSpc>
+                <a:spcPct val="100000"/>
+              </a:lnSpc>
+              <a:spcBef>
+                <a:spcPts val="0"/>
+              </a:spcBef>
+              <a:spcAft>
+                <a:spcPts val="0"/>
+              </a:spcAft>
+              <a:buClrTx/>
+              <a:buSzTx/>
+              <a:buFontTx/>
+              <a:buChar char="-"/>
+              <a:tabLst/>
+              <a:defRPr/>
+            </a:pPr>
+            <a:r>
+              <a:rPr lang="en-US" b="0" i="0" dirty="0">
+                <a:solidFill>
+                  <a:srgbClr val="ECECEC"/>
+                </a:solidFill>
+                <a:effectLst/>
+                <a:latin typeface="Google Sans"/>
+              </a:rPr>
+              <a:t>very important note: the F0 continua at dur_1 and dur_7 are derived from the base files toru_2_mod.wav and tooru_1_mod.wav respectively, rather than the endpoints that were created from making the duration continuum</a:t>
+            </a:r>
+          </a:p>
+          <a:p>
+            <a:pPr marL="628650" marR="0" lvl="1" indent="-171450" algn="l" defTabSz="914400" rtl="0" eaLnBrk="1" fontAlgn="auto" latinLnBrk="0" hangingPunct="1">
+              <a:lnSpc>
+                <a:spcPct val="100000"/>
+              </a:lnSpc>
+              <a:spcBef>
+                <a:spcPts val="0"/>
+              </a:spcBef>
+              <a:spcAft>
+                <a:spcPts val="0"/>
+              </a:spcAft>
+              <a:buClrTx/>
+              <a:buSzTx/>
+              <a:buFontTx/>
+              <a:buChar char="-"/>
+              <a:tabLst/>
+              <a:defRPr/>
+            </a:pPr>
+            <a:r>
+              <a:rPr lang="en-US" b="0" i="0" dirty="0">
+                <a:solidFill>
+                  <a:srgbClr val="ECECEC"/>
+                </a:solidFill>
+                <a:effectLst/>
+                <a:latin typeface="Google Sans"/>
+              </a:rPr>
+              <a:t>the F0 continua at dur_2, dur_3, and dur_4 were derived from the </a:t>
+            </a:r>
+            <a:r>
+              <a:rPr lang="en-US" b="0" i="0" dirty="0" err="1">
+                <a:solidFill>
+                  <a:srgbClr val="ECECEC"/>
+                </a:solidFill>
+                <a:effectLst/>
+                <a:latin typeface="Google Sans"/>
+              </a:rPr>
+              <a:t>toru_origin</a:t>
+            </a:r>
+            <a:r>
+              <a:rPr lang="en-US" b="0" i="0" dirty="0">
+                <a:solidFill>
+                  <a:srgbClr val="ECECEC"/>
+                </a:solidFill>
+                <a:effectLst/>
+                <a:latin typeface="Google Sans"/>
+              </a:rPr>
+              <a:t> duration continuum sounds</a:t>
+            </a:r>
+          </a:p>
+          <a:p>
+            <a:pPr marL="628650" marR="0" lvl="1" indent="-171450" algn="l" defTabSz="914400" rtl="0" eaLnBrk="1" fontAlgn="auto" latinLnBrk="0" hangingPunct="1">
+              <a:lnSpc>
+                <a:spcPct val="100000"/>
+              </a:lnSpc>
+              <a:spcBef>
+                <a:spcPts val="0"/>
+              </a:spcBef>
+              <a:spcAft>
+                <a:spcPts val="0"/>
+              </a:spcAft>
+              <a:buClrTx/>
+              <a:buSzTx/>
+              <a:buFontTx/>
+              <a:buChar char="-"/>
+              <a:tabLst/>
+              <a:defRPr/>
+            </a:pPr>
+            <a:r>
+              <a:rPr lang="en-US" b="0" i="0" dirty="0">
+                <a:solidFill>
+                  <a:srgbClr val="ECECEC"/>
+                </a:solidFill>
+                <a:effectLst/>
+                <a:latin typeface="Google Sans"/>
+              </a:rPr>
+              <a:t>the F0 continua at dur_4, dur_5, and dur_6 were derived from the </a:t>
+            </a:r>
+            <a:r>
+              <a:rPr lang="en-US" b="0" i="0" dirty="0" err="1">
+                <a:solidFill>
+                  <a:srgbClr val="ECECEC"/>
+                </a:solidFill>
+                <a:effectLst/>
+                <a:latin typeface="Google Sans"/>
+              </a:rPr>
+              <a:t>tooru_origin</a:t>
+            </a:r>
+            <a:r>
+              <a:rPr lang="en-US" b="0" i="0" dirty="0">
+                <a:solidFill>
+                  <a:srgbClr val="ECECEC"/>
+                </a:solidFill>
+                <a:effectLst/>
+                <a:latin typeface="Google Sans"/>
+              </a:rPr>
+              <a:t> duration continuum sounds</a:t>
+            </a:r>
+          </a:p>
+          <a:p>
+            <a:pPr marL="628650" marR="0" lvl="1" indent="-171450" algn="l" defTabSz="914400" rtl="0" eaLnBrk="1" fontAlgn="auto" latinLnBrk="0" hangingPunct="1">
+              <a:lnSpc>
+                <a:spcPct val="100000"/>
+              </a:lnSpc>
+              <a:spcBef>
+                <a:spcPts val="0"/>
+              </a:spcBef>
+              <a:spcAft>
+                <a:spcPts val="0"/>
+              </a:spcAft>
+              <a:buClrTx/>
+              <a:buSzTx/>
+              <a:buFontTx/>
+              <a:buChar char="-"/>
+              <a:tabLst/>
+              <a:defRPr/>
+            </a:pPr>
+            <a:r>
+              <a:rPr lang="en-US" b="0" i="0" dirty="0">
+                <a:solidFill>
+                  <a:srgbClr val="ECECEC"/>
+                </a:solidFill>
+                <a:effectLst/>
+                <a:latin typeface="Google Sans"/>
+              </a:rPr>
+              <a:t>so there are two versions of F0 continua at dur_4 step</a:t>
+            </a:r>
+          </a:p>
+          <a:p>
+            <a:pPr marL="628650" marR="0" lvl="1" indent="-171450" algn="l" defTabSz="914400" rtl="0" eaLnBrk="1" fontAlgn="auto" latinLnBrk="0" hangingPunct="1">
+              <a:lnSpc>
+                <a:spcPct val="100000"/>
+              </a:lnSpc>
+              <a:spcBef>
+                <a:spcPts val="0"/>
+              </a:spcBef>
+              <a:spcAft>
+                <a:spcPts val="0"/>
+              </a:spcAft>
+              <a:buClrTx/>
+              <a:buSzTx/>
+              <a:buFontTx/>
+              <a:buChar char="-"/>
+              <a:tabLst/>
+              <a:defRPr/>
+            </a:pPr>
+            <a:r>
+              <a:rPr lang="en-US" b="0" i="0" dirty="0">
+                <a:solidFill>
+                  <a:srgbClr val="ECECEC"/>
+                </a:solidFill>
+                <a:effectLst/>
+                <a:latin typeface="Google Sans"/>
+              </a:rPr>
+              <a:t>I will choose whether the sounds of the F0 continuum at dur_4 will be from the </a:t>
+            </a:r>
+            <a:r>
+              <a:rPr lang="en-US" b="0" i="0" dirty="0" err="1">
+                <a:solidFill>
+                  <a:srgbClr val="ECECEC"/>
+                </a:solidFill>
+                <a:effectLst/>
+                <a:latin typeface="Google Sans"/>
+              </a:rPr>
+              <a:t>toru_origin</a:t>
+            </a:r>
+            <a:r>
+              <a:rPr lang="en-US" b="0" i="0" dirty="0">
+                <a:solidFill>
+                  <a:srgbClr val="ECECEC"/>
+                </a:solidFill>
+                <a:effectLst/>
+                <a:latin typeface="Google Sans"/>
+              </a:rPr>
+              <a:t> or </a:t>
+            </a:r>
+            <a:r>
+              <a:rPr lang="en-US" b="0" i="0" dirty="0" err="1">
+                <a:solidFill>
+                  <a:srgbClr val="ECECEC"/>
+                </a:solidFill>
+                <a:effectLst/>
+                <a:latin typeface="Google Sans"/>
+              </a:rPr>
+              <a:t>tooru_origin</a:t>
+            </a:r>
+            <a:r>
+              <a:rPr lang="en-US" b="0" i="0" dirty="0">
+                <a:solidFill>
+                  <a:srgbClr val="ECECEC"/>
+                </a:solidFill>
+                <a:effectLst/>
+                <a:latin typeface="Google Sans"/>
+              </a:rPr>
+              <a:t> version</a:t>
+            </a:r>
+          </a:p>
+          <a:p>
+            <a:pPr marL="628650" marR="0" lvl="1" indent="-171450" algn="l" defTabSz="914400" rtl="0" eaLnBrk="1" fontAlgn="auto" latinLnBrk="0" hangingPunct="1">
+              <a:lnSpc>
+                <a:spcPct val="100000"/>
+              </a:lnSpc>
+              <a:spcBef>
+                <a:spcPts val="0"/>
+              </a:spcBef>
+              <a:spcAft>
+                <a:spcPts val="0"/>
+              </a:spcAft>
+              <a:buClrTx/>
+              <a:buSzTx/>
+              <a:buFontTx/>
+              <a:buChar char="-"/>
+              <a:tabLst/>
+              <a:defRPr/>
+            </a:pPr>
+            <a:r>
+              <a:rPr lang="en-US" b="0" i="0" dirty="0">
+                <a:solidFill>
+                  <a:srgbClr val="ECECEC"/>
+                </a:solidFill>
+                <a:effectLst/>
+                <a:latin typeface="Google Sans"/>
+              </a:rPr>
+              <a:t>for dur_4, I will probably use </a:t>
+            </a:r>
+            <a:r>
+              <a:rPr lang="en-US" b="0" i="0" dirty="0" err="1">
+                <a:solidFill>
+                  <a:srgbClr val="ECECEC"/>
+                </a:solidFill>
+                <a:effectLst/>
+                <a:latin typeface="Google Sans"/>
+              </a:rPr>
+              <a:t>toru_origin</a:t>
+            </a:r>
+            <a:r>
+              <a:rPr lang="en-US" b="0" i="0" dirty="0">
+                <a:solidFill>
+                  <a:srgbClr val="ECECEC"/>
+                </a:solidFill>
+                <a:effectLst/>
+                <a:latin typeface="Google Sans"/>
+              </a:rPr>
+              <a:t> for F0_1, F0_2, and maybe F0_3, and then </a:t>
+            </a:r>
+            <a:r>
+              <a:rPr lang="en-US" b="0" i="0" dirty="0" err="1">
+                <a:solidFill>
+                  <a:srgbClr val="ECECEC"/>
+                </a:solidFill>
+                <a:effectLst/>
+                <a:latin typeface="Google Sans"/>
+              </a:rPr>
+              <a:t>tooru_origin</a:t>
+            </a:r>
+            <a:r>
+              <a:rPr lang="en-US" b="0" i="0" dirty="0">
+                <a:solidFill>
+                  <a:srgbClr val="ECECEC"/>
+                </a:solidFill>
+                <a:effectLst/>
+                <a:latin typeface="Google Sans"/>
+              </a:rPr>
+              <a:t> for F0_4 and F0_5, and maybe F0_3</a:t>
+            </a:r>
+          </a:p>
+          <a:p>
+            <a:pPr marL="628650" marR="0" lvl="1" indent="-171450" algn="l" defTabSz="914400" rtl="0" eaLnBrk="1" fontAlgn="auto" latinLnBrk="0" hangingPunct="1">
+              <a:lnSpc>
+                <a:spcPct val="100000"/>
+              </a:lnSpc>
+              <a:spcBef>
+                <a:spcPts val="0"/>
+              </a:spcBef>
+              <a:spcAft>
+                <a:spcPts val="0"/>
+              </a:spcAft>
+              <a:buClrTx/>
+              <a:buSzTx/>
+              <a:buFontTx/>
+              <a:buChar char="-"/>
+              <a:tabLst/>
+              <a:defRPr/>
+            </a:pPr>
+            <a:r>
+              <a:rPr lang="en-US" b="0" i="0" dirty="0">
+                <a:solidFill>
+                  <a:srgbClr val="ECECEC"/>
+                </a:solidFill>
+                <a:effectLst/>
+                <a:latin typeface="Google Sans"/>
+              </a:rPr>
+              <a:t>***final choices, from my own ear: I will use </a:t>
+            </a:r>
+            <a:r>
+              <a:rPr lang="en-US" b="0" i="0" dirty="0" err="1">
+                <a:solidFill>
+                  <a:srgbClr val="ECECEC"/>
+                </a:solidFill>
+                <a:effectLst/>
+                <a:latin typeface="Google Sans"/>
+              </a:rPr>
+              <a:t>toru_origin</a:t>
+            </a:r>
+            <a:r>
+              <a:rPr lang="en-US" b="0" i="0" dirty="0">
+                <a:solidFill>
+                  <a:srgbClr val="ECECEC"/>
+                </a:solidFill>
+                <a:effectLst/>
+                <a:latin typeface="Google Sans"/>
+              </a:rPr>
+              <a:t> for dur_4_F0_1, and </a:t>
+            </a:r>
+            <a:r>
+              <a:rPr lang="en-US" b="0" i="0" dirty="0" err="1">
+                <a:solidFill>
+                  <a:srgbClr val="ECECEC"/>
+                </a:solidFill>
+                <a:effectLst/>
+                <a:latin typeface="Google Sans"/>
+              </a:rPr>
+              <a:t>tooru_origin</a:t>
+            </a:r>
+            <a:r>
+              <a:rPr lang="en-US" b="0" i="0" dirty="0">
+                <a:solidFill>
+                  <a:srgbClr val="ECECEC"/>
+                </a:solidFill>
+                <a:effectLst/>
+                <a:latin typeface="Google Sans"/>
+              </a:rPr>
+              <a:t> for the rest of dur_4 series (F0_2, F0_3, F0_4, F0_5) – these just sounded more natural from </a:t>
+            </a:r>
+            <a:r>
+              <a:rPr lang="en-US" b="0" i="0" dirty="0" err="1">
+                <a:solidFill>
+                  <a:srgbClr val="ECECEC"/>
+                </a:solidFill>
+                <a:effectLst/>
+                <a:latin typeface="Google Sans"/>
+              </a:rPr>
+              <a:t>tooru_origin</a:t>
+            </a:r>
+            <a:r>
+              <a:rPr lang="en-US" b="0" i="0" dirty="0">
+                <a:solidFill>
+                  <a:srgbClr val="ECECEC"/>
+                </a:solidFill>
+                <a:effectLst/>
+                <a:latin typeface="Google Sans"/>
+              </a:rPr>
+              <a:t>, while only F0_1 sounded more natural from </a:t>
+            </a:r>
+            <a:r>
+              <a:rPr lang="en-US" b="0" i="0" dirty="0" err="1">
+                <a:solidFill>
+                  <a:srgbClr val="ECECEC"/>
+                </a:solidFill>
+                <a:effectLst/>
+                <a:latin typeface="Google Sans"/>
+              </a:rPr>
+              <a:t>toru_origin</a:t>
+            </a:r>
+            <a:r>
+              <a:rPr lang="en-US" b="0" i="0" dirty="0">
+                <a:solidFill>
+                  <a:srgbClr val="ECECEC"/>
+                </a:solidFill>
+                <a:effectLst/>
+                <a:latin typeface="Google Sans"/>
+              </a:rPr>
+              <a:t> (only slightly) – see the next slide</a:t>
+            </a:r>
+            <a:endParaRPr lang="en-US" dirty="0">
+              <a:solidFill>
+                <a:srgbClr val="000000"/>
+              </a:solidFill>
+              <a:effectLst/>
+              <a:latin typeface="Menlo" panose="020B0609030804020204" pitchFamily="49" charset="0"/>
+            </a:endParaRPr>
+          </a:p>
+          <a:p>
+            <a:pPr marL="171450" indent="-171450">
+              <a:buFontTx/>
+              <a:buChar char="-"/>
+            </a:pPr>
+            <a:endParaRPr lang="en-US" dirty="0"/>
           </a:p>
         </p:txBody>
       </p:sp>
@@ -2570,7 +2561,7 @@
           <a:p>
             <a:fld id="{8D84D065-75B2-C547-A1E0-43719E6097C2}" type="slidenum">
               <a:rPr lang="en-US" smtClean="0"/>
-              <a:t>34</a:t>
+              <a:t>33</a:t>
             </a:fld>
             <a:endParaRPr lang="en-US"/>
           </a:p>
@@ -2579,7 +2570,7 @@
     </p:spTree>
     <p:extLst>
       <p:ext uri="{BB962C8B-B14F-4D97-AF65-F5344CB8AC3E}">
-        <p14:creationId xmlns:p14="http://schemas.microsoft.com/office/powerpoint/2010/main" val="3542539425"/>
+        <p14:creationId xmlns:p14="http://schemas.microsoft.com/office/powerpoint/2010/main" val="1750055933"/>
       </p:ext>
     </p:extLst>
   </p:cSld>
@@ -2633,7 +2624,16 @@
           <a:bodyPr/>
           <a:lstStyle/>
           <a:p>
-            <a:endParaRPr lang="en-US" dirty="0"/>
+            <a:r>
+              <a:rPr lang="en-US" dirty="0"/>
+              <a:t>final picks for toru-tooru</a:t>
+            </a:r>
+          </a:p>
+          <a:p>
+            <a:r>
+              <a:rPr lang="en-US" dirty="0"/>
+              <a:t>Final stimuli choices for Vowel Duration x Pitch Contour continuum matrix </a:t>
+            </a:r>
           </a:p>
         </p:txBody>
       </p:sp>
@@ -2654,7 +2654,7 @@
           <a:p>
             <a:fld id="{8D84D065-75B2-C547-A1E0-43719E6097C2}" type="slidenum">
               <a:rPr lang="en-US" smtClean="0"/>
-              <a:t>38</a:t>
+              <a:t>34</a:t>
             </a:fld>
             <a:endParaRPr lang="en-US"/>
           </a:p>
@@ -2663,7 +2663,7 @@
     </p:spTree>
     <p:extLst>
       <p:ext uri="{BB962C8B-B14F-4D97-AF65-F5344CB8AC3E}">
-        <p14:creationId xmlns:p14="http://schemas.microsoft.com/office/powerpoint/2010/main" val="1480446047"/>
+        <p14:creationId xmlns:p14="http://schemas.microsoft.com/office/powerpoint/2010/main" val="3542539425"/>
       </p:ext>
     </p:extLst>
   </p:cSld>
@@ -2717,56 +2717,6 @@
           <a:bodyPr/>
           <a:lstStyle/>
           <a:p>
-            <a:pPr marL="0" marR="0" lvl="0" indent="0" algn="l" defTabSz="914400" rtl="0" eaLnBrk="1" fontAlgn="auto" latinLnBrk="0" hangingPunct="1">
-              <a:lnSpc>
-                <a:spcPct val="100000"/>
-              </a:lnSpc>
-              <a:spcBef>
-                <a:spcPts val="0"/>
-              </a:spcBef>
-              <a:spcAft>
-                <a:spcPts val="0"/>
-              </a:spcAft>
-              <a:buClrTx/>
-              <a:buSzTx/>
-              <a:buFontTx/>
-              <a:buNone/>
-              <a:tabLst/>
-              <a:defRPr/>
-            </a:pPr>
-            <a:r>
-              <a:rPr lang="en-US" sz="1200" dirty="0"/>
-              <a:t>because the interpolations of F0 at these time points are all a little different across the seven duration steps,  here are the values from dur_1 (</a:t>
-            </a:r>
-            <a:r>
-              <a:rPr lang="en-US" sz="1200" dirty="0" err="1"/>
-              <a:t>toru</a:t>
-            </a:r>
-            <a:r>
-              <a:rPr lang="en-US" sz="1200" dirty="0"/>
-              <a:t>-origin) and dur_7 (</a:t>
-            </a:r>
-            <a:r>
-              <a:rPr lang="en-US" sz="1200" dirty="0" err="1"/>
-              <a:t>tooru</a:t>
-            </a:r>
-            <a:r>
-              <a:rPr lang="en-US" sz="1200" dirty="0"/>
-              <a:t>-origin) out of ease (dur_1_F0_toru_origin_tooru_log.csv and dur_7_F0_tooru_origin_toru_log.csv)</a:t>
-            </a:r>
-          </a:p>
-          <a:p>
-            <a:endParaRPr lang="en-US" dirty="0"/>
-          </a:p>
-          <a:p>
-            <a:r>
-              <a:rPr lang="en-US" dirty="0"/>
-              <a:t>I could probably expand this to all of the duration steps for </a:t>
-            </a:r>
-            <a:r>
-              <a:rPr lang="en-US"/>
-              <a:t>the appendix</a:t>
-            </a:r>
             <a:endParaRPr lang="en-US" dirty="0"/>
           </a:p>
         </p:txBody>
@@ -2788,7 +2738,7 @@
           <a:p>
             <a:fld id="{8D84D065-75B2-C547-A1E0-43719E6097C2}" type="slidenum">
               <a:rPr lang="en-US" smtClean="0"/>
-              <a:t>40</a:t>
+              <a:t>38</a:t>
             </a:fld>
             <a:endParaRPr lang="en-US"/>
           </a:p>
@@ -2797,7 +2747,7 @@
     </p:spTree>
     <p:extLst>
       <p:ext uri="{BB962C8B-B14F-4D97-AF65-F5344CB8AC3E}">
-        <p14:creationId xmlns:p14="http://schemas.microsoft.com/office/powerpoint/2010/main" val="2324672648"/>
+        <p14:creationId xmlns:p14="http://schemas.microsoft.com/office/powerpoint/2010/main" val="1480446047"/>
       </p:ext>
     </p:extLst>
   </p:cSld>
@@ -2851,7 +2801,52 @@
           <a:bodyPr/>
           <a:lstStyle/>
           <a:p>
+            <a:pPr marL="0" marR="0" lvl="0" indent="0" algn="l" defTabSz="914400" rtl="0" eaLnBrk="1" fontAlgn="auto" latinLnBrk="0" hangingPunct="1">
+              <a:lnSpc>
+                <a:spcPct val="100000"/>
+              </a:lnSpc>
+              <a:spcBef>
+                <a:spcPts val="0"/>
+              </a:spcBef>
+              <a:spcAft>
+                <a:spcPts val="0"/>
+              </a:spcAft>
+              <a:buClrTx/>
+              <a:buSzTx/>
+              <a:buFontTx/>
+              <a:buNone/>
+              <a:tabLst/>
+              <a:defRPr/>
+            </a:pPr>
+            <a:r>
+              <a:rPr lang="en-US" sz="1200" dirty="0"/>
+              <a:t>because the interpolations of F0 at these time points are all a little different across the seven duration steps,  here are the values from dur_1 (</a:t>
+            </a:r>
+            <a:r>
+              <a:rPr lang="en-US" sz="1200" dirty="0" err="1"/>
+              <a:t>toru</a:t>
+            </a:r>
+            <a:r>
+              <a:rPr lang="en-US" sz="1200" dirty="0"/>
+              <a:t>-origin) and dur_7 (</a:t>
+            </a:r>
+            <a:r>
+              <a:rPr lang="en-US" sz="1200" dirty="0" err="1"/>
+              <a:t>tooru</a:t>
+            </a:r>
+            <a:r>
+              <a:rPr lang="en-US" sz="1200" dirty="0"/>
+              <a:t>-origin) out of ease (dur_1_F0_toru_origin_tooru_log.csv and dur_7_F0_tooru_origin_toru_log.csv)</a:t>
+            </a:r>
+          </a:p>
+          <a:p>
             <a:endParaRPr lang="en-US" dirty="0"/>
+          </a:p>
+          <a:p>
+            <a:r>
+              <a:rPr lang="en-US" dirty="0"/>
+              <a:t>I could probably expand this to all of the duration steps for the appendix</a:t>
+            </a:r>
           </a:p>
         </p:txBody>
       </p:sp>
@@ -2872,7 +2867,7 @@
           <a:p>
             <a:fld id="{8D84D065-75B2-C547-A1E0-43719E6097C2}" type="slidenum">
               <a:rPr lang="en-US" smtClean="0"/>
-              <a:t>41</a:t>
+              <a:t>40</a:t>
             </a:fld>
             <a:endParaRPr lang="en-US"/>
           </a:p>
@@ -2881,7 +2876,7 @@
     </p:spTree>
     <p:extLst>
       <p:ext uri="{BB962C8B-B14F-4D97-AF65-F5344CB8AC3E}">
-        <p14:creationId xmlns:p14="http://schemas.microsoft.com/office/powerpoint/2010/main" val="78564522"/>
+        <p14:creationId xmlns:p14="http://schemas.microsoft.com/office/powerpoint/2010/main" val="2324672648"/>
       </p:ext>
     </p:extLst>
   </p:cSld>
@@ -2956,7 +2951,7 @@
           <a:p>
             <a:fld id="{8D84D065-75B2-C547-A1E0-43719E6097C2}" type="slidenum">
               <a:rPr lang="en-US" smtClean="0"/>
-              <a:t>43</a:t>
+              <a:t>41</a:t>
             </a:fld>
             <a:endParaRPr lang="en-US"/>
           </a:p>
@@ -2965,7 +2960,7 @@
     </p:spTree>
     <p:extLst>
       <p:ext uri="{BB962C8B-B14F-4D97-AF65-F5344CB8AC3E}">
-        <p14:creationId xmlns:p14="http://schemas.microsoft.com/office/powerpoint/2010/main" val="4187077988"/>
+        <p14:creationId xmlns:p14="http://schemas.microsoft.com/office/powerpoint/2010/main" val="78564522"/>
       </p:ext>
     </p:extLst>
   </p:cSld>
@@ -3025,15 +3020,7 @@
             </a:pPr>
             <a:r>
               <a:rPr lang="en-US" dirty="0"/>
-              <a:t>first attempt – English was good, kata/</a:t>
-            </a:r>
-            <a:r>
-              <a:rPr lang="en-US" dirty="0" err="1"/>
-              <a:t>katta</a:t>
-            </a:r>
-            <a:r>
-              <a:rPr lang="en-US" dirty="0"/>
-              <a:t> had vocal fry at the end of the utterance = YA-raw-recording-sept-6-first-attempt.wav</a:t>
+              <a:t>first attempt – English was good, kata/katta had vocal fry at the end of the utterance = female-raw-recording-sept-6-first-attempt.wav</a:t>
             </a:r>
           </a:p>
           <a:p>
@@ -3043,15 +3030,7 @@
             </a:pPr>
             <a:r>
               <a:rPr lang="en-US" dirty="0"/>
-              <a:t>second attempt – just kata/</a:t>
-            </a:r>
-            <a:r>
-              <a:rPr lang="en-US" dirty="0" err="1"/>
-              <a:t>katta</a:t>
-            </a:r>
-            <a:r>
-              <a:rPr lang="en-US" dirty="0"/>
-              <a:t>, did without the pause to avoid vocal fry, which was successful, only issue is the end just sounds a bit off because it sounds like there should be something afterwards (same problem as attempt #2 from the first time) = YA-raw-recording-sept-6-second-attempt.wav</a:t>
+              <a:t>second attempt – just kata/katta, did without the pause to avoid vocal fry, which was successful, only issue is the end just sounds a bit off because it sounds like there should be something afterwards (same problem as attempt #2 from the first time) = female-raw-recording-sept-6-second-attempt.wav</a:t>
             </a:r>
           </a:p>
         </p:txBody>
@@ -3157,6 +3136,90 @@
           <a:p>
             <a:fld id="{8D84D065-75B2-C547-A1E0-43719E6097C2}" type="slidenum">
               <a:rPr lang="en-US" smtClean="0"/>
+              <a:t>43</a:t>
+            </a:fld>
+            <a:endParaRPr lang="en-US"/>
+          </a:p>
+        </p:txBody>
+      </p:sp>
+    </p:spTree>
+    <p:extLst>
+      <p:ext uri="{BB962C8B-B14F-4D97-AF65-F5344CB8AC3E}">
+        <p14:creationId xmlns:p14="http://schemas.microsoft.com/office/powerpoint/2010/main" val="4187077988"/>
+      </p:ext>
+    </p:extLst>
+  </p:cSld>
+  <p:clrMapOvr>
+    <a:masterClrMapping/>
+  </p:clrMapOvr>
+</p:notes>
+</file>
+
+<file path=ppt/notesSlides/notesSlide21.xml><?xml version="1.0" encoding="utf-8"?>
+<p:notes xmlns:a="http://schemas.openxmlformats.org/drawingml/2006/main" xmlns:r="http://schemas.openxmlformats.org/officeDocument/2006/relationships" xmlns:p="http://schemas.openxmlformats.org/presentationml/2006/main">
+  <p:cSld>
+    <p:spTree>
+      <p:nvGrpSpPr>
+        <p:cNvPr id="1" name=""/>
+        <p:cNvGrpSpPr/>
+        <p:nvPr/>
+      </p:nvGrpSpPr>
+      <p:grpSpPr>
+        <a:xfrm>
+          <a:off x="0" y="0"/>
+          <a:ext cx="0" cy="0"/>
+          <a:chOff x="0" y="0"/>
+          <a:chExt cx="0" cy="0"/>
+        </a:xfrm>
+      </p:grpSpPr>
+      <p:sp>
+        <p:nvSpPr>
+          <p:cNvPr id="2" name="Slide Image Placeholder 1"/>
+          <p:cNvSpPr>
+            <a:spLocks noGrp="1" noRot="1" noChangeAspect="1"/>
+          </p:cNvSpPr>
+          <p:nvPr>
+            <p:ph type="sldImg"/>
+          </p:nvPr>
+        </p:nvSpPr>
+        <p:spPr/>
+      </p:sp>
+      <p:sp>
+        <p:nvSpPr>
+          <p:cNvPr id="3" name="Notes Placeholder 2"/>
+          <p:cNvSpPr>
+            <a:spLocks noGrp="1"/>
+          </p:cNvSpPr>
+          <p:nvPr>
+            <p:ph type="body" idx="1"/>
+          </p:nvPr>
+        </p:nvSpPr>
+        <p:spPr/>
+        <p:txBody>
+          <a:bodyPr/>
+          <a:lstStyle/>
+          <a:p>
+            <a:endParaRPr lang="en-US" dirty="0"/>
+          </a:p>
+        </p:txBody>
+      </p:sp>
+      <p:sp>
+        <p:nvSpPr>
+          <p:cNvPr id="4" name="Slide Number Placeholder 3"/>
+          <p:cNvSpPr>
+            <a:spLocks noGrp="1"/>
+          </p:cNvSpPr>
+          <p:nvPr>
+            <p:ph type="sldNum" sz="quarter" idx="5"/>
+          </p:nvPr>
+        </p:nvSpPr>
+        <p:spPr/>
+        <p:txBody>
+          <a:bodyPr/>
+          <a:lstStyle/>
+          <a:p>
+            <a:fld id="{8D84D065-75B2-C547-A1E0-43719E6097C2}" type="slidenum">
+              <a:rPr lang="en-US" smtClean="0"/>
               <a:t>44</a:t>
             </a:fld>
             <a:endParaRPr lang="en-US"/>
@@ -3415,7 +3478,7 @@
           <a:p>
             <a:fld id="{8D84D065-75B2-C547-A1E0-43719E6097C2}" type="slidenum">
               <a:rPr lang="en-US" smtClean="0"/>
-              <a:t>21</a:t>
+              <a:t>15</a:t>
             </a:fld>
             <a:endParaRPr lang="en-US"/>
           </a:p>
@@ -3424,7 +3487,7 @@
     </p:spTree>
     <p:extLst>
       <p:ext uri="{BB962C8B-B14F-4D97-AF65-F5344CB8AC3E}">
-        <p14:creationId xmlns:p14="http://schemas.microsoft.com/office/powerpoint/2010/main" val="4125566894"/>
+        <p14:creationId xmlns:p14="http://schemas.microsoft.com/office/powerpoint/2010/main" val="2709841195"/>
       </p:ext>
     </p:extLst>
   </p:cSld>
@@ -3478,35 +3541,7 @@
           <a:bodyPr/>
           <a:lstStyle/>
           <a:p>
-            <a:r>
-              <a:rPr lang="en-US" dirty="0"/>
-              <a:t>suggestions for vowels: </a:t>
-            </a:r>
-            <a:r>
-              <a:rPr lang="en-US" b="0" i="0" dirty="0">
-                <a:solidFill>
-                  <a:srgbClr val="1A1A1A"/>
-                </a:solidFill>
-                <a:effectLst/>
-                <a:highlight>
-                  <a:srgbClr val="FFFFFF"/>
-                </a:highlight>
-                <a:latin typeface="Helvetica" pitchFamily="2" charset="0"/>
-              </a:rPr>
-              <a:t>using the criterion that there be no abrupt changes in formant movement throughout the vowel, no abrupt changes in fundamental frequency, and minimal extraneous noise (to facilitate resynthesis) </a:t>
-            </a:r>
-            <a:r>
-              <a:rPr lang="en-US" dirty="0"/>
-              <a:t>(</a:t>
-            </a:r>
-            <a:r>
-              <a:rPr lang="en-US" dirty="0" err="1"/>
-              <a:t>Kondaurova</a:t>
-            </a:r>
-            <a:r>
-              <a:rPr lang="en-US" dirty="0"/>
-              <a:t> &amp; Francis, 2008)</a:t>
-            </a:r>
+            <a:endParaRPr lang="en-US" dirty="0"/>
           </a:p>
         </p:txBody>
       </p:sp>
@@ -3527,7 +3562,7 @@
           <a:p>
             <a:fld id="{8D84D065-75B2-C547-A1E0-43719E6097C2}" type="slidenum">
               <a:rPr lang="en-US" smtClean="0"/>
-              <a:t>25</a:t>
+              <a:t>21</a:t>
             </a:fld>
             <a:endParaRPr lang="en-US"/>
           </a:p>
@@ -3536,7 +3571,7 @@
     </p:spTree>
     <p:extLst>
       <p:ext uri="{BB962C8B-B14F-4D97-AF65-F5344CB8AC3E}">
-        <p14:creationId xmlns:p14="http://schemas.microsoft.com/office/powerpoint/2010/main" val="1323200956"/>
+        <p14:creationId xmlns:p14="http://schemas.microsoft.com/office/powerpoint/2010/main" val="4125566894"/>
       </p:ext>
     </p:extLst>
   </p:cSld>
@@ -3639,7 +3674,7 @@
           <a:p>
             <a:fld id="{8D84D065-75B2-C547-A1E0-43719E6097C2}" type="slidenum">
               <a:rPr lang="en-US" smtClean="0"/>
-              <a:t>26</a:t>
+              <a:t>25</a:t>
             </a:fld>
             <a:endParaRPr lang="en-US"/>
           </a:p>
@@ -3648,7 +3683,7 @@
     </p:spTree>
     <p:extLst>
       <p:ext uri="{BB962C8B-B14F-4D97-AF65-F5344CB8AC3E}">
-        <p14:creationId xmlns:p14="http://schemas.microsoft.com/office/powerpoint/2010/main" val="2987046679"/>
+        <p14:creationId xmlns:p14="http://schemas.microsoft.com/office/powerpoint/2010/main" val="1323200956"/>
       </p:ext>
     </p:extLst>
   </p:cSld>
@@ -3702,7 +3737,35 @@
           <a:bodyPr/>
           <a:lstStyle/>
           <a:p>
-            <a:endParaRPr lang="en-US" dirty="0"/>
+            <a:r>
+              <a:rPr lang="en-US" dirty="0"/>
+              <a:t>suggestions for vowels: </a:t>
+            </a:r>
+            <a:r>
+              <a:rPr lang="en-US" b="0" i="0" dirty="0">
+                <a:solidFill>
+                  <a:srgbClr val="1A1A1A"/>
+                </a:solidFill>
+                <a:effectLst/>
+                <a:highlight>
+                  <a:srgbClr val="FFFFFF"/>
+                </a:highlight>
+                <a:latin typeface="Helvetica" pitchFamily="2" charset="0"/>
+              </a:rPr>
+              <a:t>using the criterion that there be no abrupt changes in formant movement throughout the vowel, no abrupt changes in fundamental frequency, and minimal extraneous noise (to facilitate resynthesis) </a:t>
+            </a:r>
+            <a:r>
+              <a:rPr lang="en-US" dirty="0"/>
+              <a:t>(</a:t>
+            </a:r>
+            <a:r>
+              <a:rPr lang="en-US" dirty="0" err="1"/>
+              <a:t>Kondaurova</a:t>
+            </a:r>
+            <a:r>
+              <a:rPr lang="en-US" dirty="0"/>
+              <a:t> &amp; Francis, 2008)</a:t>
+            </a:r>
           </a:p>
         </p:txBody>
       </p:sp>
@@ -3723,7 +3786,7 @@
           <a:p>
             <a:fld id="{8D84D065-75B2-C547-A1E0-43719E6097C2}" type="slidenum">
               <a:rPr lang="en-US" smtClean="0"/>
-              <a:t>27</a:t>
+              <a:t>26</a:t>
             </a:fld>
             <a:endParaRPr lang="en-US"/>
           </a:p>
@@ -3732,7 +3795,7 @@
     </p:spTree>
     <p:extLst>
       <p:ext uri="{BB962C8B-B14F-4D97-AF65-F5344CB8AC3E}">
-        <p14:creationId xmlns:p14="http://schemas.microsoft.com/office/powerpoint/2010/main" val="257002015"/>
+        <p14:creationId xmlns:p14="http://schemas.microsoft.com/office/powerpoint/2010/main" val="2987046679"/>
       </p:ext>
     </p:extLst>
   </p:cSld>
@@ -3807,7 +3870,7 @@
           <a:p>
             <a:fld id="{8D84D065-75B2-C547-A1E0-43719E6097C2}" type="slidenum">
               <a:rPr lang="en-US" smtClean="0"/>
-              <a:t>28</a:t>
+              <a:t>27</a:t>
             </a:fld>
             <a:endParaRPr lang="en-US"/>
           </a:p>
@@ -3816,7 +3879,7 @@
     </p:spTree>
     <p:extLst>
       <p:ext uri="{BB962C8B-B14F-4D97-AF65-F5344CB8AC3E}">
-        <p14:creationId xmlns:p14="http://schemas.microsoft.com/office/powerpoint/2010/main" val="2402246965"/>
+        <p14:creationId xmlns:p14="http://schemas.microsoft.com/office/powerpoint/2010/main" val="257002015"/>
       </p:ext>
     </p:extLst>
   </p:cSld>
@@ -3973,7 +4036,7 @@
           <a:p>
             <a:fld id="{CB783F3F-B366-5248-ADE6-8F5403DF1A04}" type="datetimeFigureOut">
               <a:rPr lang="en-US" smtClean="0"/>
-              <a:t>8/4/25</a:t>
+              <a:t>8/9/25</a:t>
             </a:fld>
             <a:endParaRPr lang="en-US"/>
           </a:p>
@@ -4171,7 +4234,7 @@
           <a:p>
             <a:fld id="{CB783F3F-B366-5248-ADE6-8F5403DF1A04}" type="datetimeFigureOut">
               <a:rPr lang="en-US" smtClean="0"/>
-              <a:t>8/4/25</a:t>
+              <a:t>8/9/25</a:t>
             </a:fld>
             <a:endParaRPr lang="en-US"/>
           </a:p>
@@ -4379,7 +4442,7 @@
           <a:p>
             <a:fld id="{CB783F3F-B366-5248-ADE6-8F5403DF1A04}" type="datetimeFigureOut">
               <a:rPr lang="en-US" smtClean="0"/>
-              <a:t>8/4/25</a:t>
+              <a:t>8/9/25</a:t>
             </a:fld>
             <a:endParaRPr lang="en-US"/>
           </a:p>
@@ -4577,7 +4640,7 @@
           <a:p>
             <a:fld id="{CB783F3F-B366-5248-ADE6-8F5403DF1A04}" type="datetimeFigureOut">
               <a:rPr lang="en-US" smtClean="0"/>
-              <a:t>8/4/25</a:t>
+              <a:t>8/9/25</a:t>
             </a:fld>
             <a:endParaRPr lang="en-US"/>
           </a:p>
@@ -4852,7 +4915,7 @@
           <a:p>
             <a:fld id="{CB783F3F-B366-5248-ADE6-8F5403DF1A04}" type="datetimeFigureOut">
               <a:rPr lang="en-US" smtClean="0"/>
-              <a:t>8/4/25</a:t>
+              <a:t>8/9/25</a:t>
             </a:fld>
             <a:endParaRPr lang="en-US"/>
           </a:p>
@@ -5117,7 +5180,7 @@
           <a:p>
             <a:fld id="{CB783F3F-B366-5248-ADE6-8F5403DF1A04}" type="datetimeFigureOut">
               <a:rPr lang="en-US" smtClean="0"/>
-              <a:t>8/4/25</a:t>
+              <a:t>8/9/25</a:t>
             </a:fld>
             <a:endParaRPr lang="en-US"/>
           </a:p>
@@ -5529,7 +5592,7 @@
           <a:p>
             <a:fld id="{CB783F3F-B366-5248-ADE6-8F5403DF1A04}" type="datetimeFigureOut">
               <a:rPr lang="en-US" smtClean="0"/>
-              <a:t>8/4/25</a:t>
+              <a:t>8/9/25</a:t>
             </a:fld>
             <a:endParaRPr lang="en-US"/>
           </a:p>
@@ -5670,7 +5733,7 @@
           <a:p>
             <a:fld id="{CB783F3F-B366-5248-ADE6-8F5403DF1A04}" type="datetimeFigureOut">
               <a:rPr lang="en-US" smtClean="0"/>
-              <a:t>8/4/25</a:t>
+              <a:t>8/9/25</a:t>
             </a:fld>
             <a:endParaRPr lang="en-US"/>
           </a:p>
@@ -5783,7 +5846,7 @@
           <a:p>
             <a:fld id="{CB783F3F-B366-5248-ADE6-8F5403DF1A04}" type="datetimeFigureOut">
               <a:rPr lang="en-US" smtClean="0"/>
-              <a:t>8/4/25</a:t>
+              <a:t>8/9/25</a:t>
             </a:fld>
             <a:endParaRPr lang="en-US"/>
           </a:p>
@@ -6094,7 +6157,7 @@
           <a:p>
             <a:fld id="{CB783F3F-B366-5248-ADE6-8F5403DF1A04}" type="datetimeFigureOut">
               <a:rPr lang="en-US" smtClean="0"/>
-              <a:t>8/4/25</a:t>
+              <a:t>8/9/25</a:t>
             </a:fld>
             <a:endParaRPr lang="en-US"/>
           </a:p>
@@ -6382,7 +6445,7 @@
           <a:p>
             <a:fld id="{CB783F3F-B366-5248-ADE6-8F5403DF1A04}" type="datetimeFigureOut">
               <a:rPr lang="en-US" smtClean="0"/>
-              <a:t>8/4/25</a:t>
+              <a:t>8/9/25</a:t>
             </a:fld>
             <a:endParaRPr lang="en-US"/>
           </a:p>
@@ -6623,7 +6686,7 @@
           <a:p>
             <a:fld id="{CB783F3F-B366-5248-ADE6-8F5403DF1A04}" type="datetimeFigureOut">
               <a:rPr lang="en-US" smtClean="0"/>
-              <a:t>8/4/25</a:t>
+              <a:t>8/9/25</a:t>
             </a:fld>
             <a:endParaRPr lang="en-US"/>
           </a:p>
@@ -7542,7 +7605,7 @@
           <a:p>
             <a:r>
               <a:rPr lang="en-US" dirty="0"/>
-              <a:t>Recordings</a:t>
+              <a:t>Source recordings for each contrast pair</a:t>
             </a:r>
           </a:p>
         </p:txBody>
@@ -7570,7 +7633,7 @@
           <a:p>
             <a:r>
               <a:rPr lang="en-US" dirty="0"/>
-              <a:t>YA-raw-recording-june-4-third-attempt.wav</a:t>
+              <a:t>female-raw-recording-june-4-third-attempt.wav</a:t>
             </a:r>
           </a:p>
           <a:p>
@@ -7599,7 +7662,7 @@
           <a:p>
             <a:r>
               <a:rPr lang="en-US" dirty="0"/>
-              <a:t>YA-raw-recording-sept-6-first-attempt.wav</a:t>
+              <a:t>female-raw-recording-sept-6-first-attempt.wav</a:t>
             </a:r>
           </a:p>
           <a:p>
@@ -7626,7 +7689,7 @@
           <a:p>
             <a:r>
               <a:rPr lang="en-US" dirty="0"/>
-              <a:t>YA-raw-recording-sept-6-second-attempt.wav</a:t>
+              <a:t>female-raw-recording-sept-6-second-attempt.wav</a:t>
             </a:r>
           </a:p>
           <a:p>
@@ -14669,10 +14732,38 @@
             </a:r>
           </a:p>
           <a:p>
+            <a:pPr lvl="1"/>
+            <a:r>
+              <a:rPr lang="en-US" dirty="0"/>
+              <a:t>adapted from source script: </a:t>
+            </a:r>
+            <a:r>
+              <a:rPr lang="en-US" dirty="0">
+                <a:hlinkClick r:id="rId2"/>
+              </a:rPr>
+              <a:t>https://github.com//ListenLab/Praat/blob/master/Scale_intensity_all_sounds_in_folder_v1.txt</a:t>
+            </a:r>
+            <a:endParaRPr lang="en-US" dirty="0"/>
+          </a:p>
+          <a:p>
             <a:r>
               <a:rPr lang="en-US" dirty="0"/>
               <a:t>saved as both wav and mp3 files</a:t>
             </a:r>
+          </a:p>
+          <a:p>
+            <a:pPr lvl="1"/>
+            <a:r>
+              <a:rPr lang="en-US" dirty="0"/>
+              <a:t>adapted from source script: </a:t>
+            </a:r>
+            <a:r>
+              <a:rPr lang="en-US" dirty="0">
+                <a:hlinkClick r:id="rId3"/>
+              </a:rPr>
+              <a:t>http://www.mattwinn.com/praat/Save_all_selected_sounds.txt</a:t>
+            </a:r>
+            <a:endParaRPr lang="en-US" dirty="0"/>
           </a:p>
         </p:txBody>
       </p:sp>
@@ -15008,7 +15099,15 @@
           <a:p>
             <a:r>
               <a:rPr lang="en-US" dirty="0"/>
-              <a:t>there is pre-voicing on &lt;j&gt; words that is included in segmentation</a:t>
+              <a:t>there is pre-voicing on “j” (e.g. “</a:t>
+            </a:r>
+            <a:r>
+              <a:rPr lang="en-US" dirty="0" err="1"/>
+              <a:t>jutaku</a:t>
+            </a:r>
+            <a:r>
+              <a:rPr lang="en-US" dirty="0"/>
+              <a:t>”) words that is included in segmentation</a:t>
             </a:r>
           </a:p>
         </p:txBody>

</xml_diff>